<commit_message>
add one slide to lecture 11
</commit_message>
<xml_diff>
--- a/classes/stats2015/Lecture11.pptx
+++ b/classes/stats2015/Lecture11.pptx
@@ -5,7 +5,7 @@
     <p:sldMasterId id="2147483648" r:id="rId1"/>
   </p:sldMasterIdLst>
   <p:notesMasterIdLst>
-    <p:notesMasterId r:id="rId53"/>
+    <p:notesMasterId r:id="rId54"/>
   </p:notesMasterIdLst>
   <p:sldIdLst>
     <p:sldId id="269" r:id="rId2"/>
@@ -48,17 +48,18 @@
     <p:sldId id="296" r:id="rId39"/>
     <p:sldId id="297" r:id="rId40"/>
     <p:sldId id="298" r:id="rId41"/>
-    <p:sldId id="299" r:id="rId42"/>
-    <p:sldId id="300" r:id="rId43"/>
-    <p:sldId id="310" r:id="rId44"/>
-    <p:sldId id="303" r:id="rId45"/>
-    <p:sldId id="304" r:id="rId46"/>
-    <p:sldId id="305" r:id="rId47"/>
-    <p:sldId id="306" r:id="rId48"/>
-    <p:sldId id="307" r:id="rId49"/>
-    <p:sldId id="308" r:id="rId50"/>
-    <p:sldId id="309" r:id="rId51"/>
-    <p:sldId id="302" r:id="rId52"/>
+    <p:sldId id="314" r:id="rId42"/>
+    <p:sldId id="299" r:id="rId43"/>
+    <p:sldId id="300" r:id="rId44"/>
+    <p:sldId id="310" r:id="rId45"/>
+    <p:sldId id="303" r:id="rId46"/>
+    <p:sldId id="304" r:id="rId47"/>
+    <p:sldId id="305" r:id="rId48"/>
+    <p:sldId id="306" r:id="rId49"/>
+    <p:sldId id="307" r:id="rId50"/>
+    <p:sldId id="308" r:id="rId51"/>
+    <p:sldId id="309" r:id="rId52"/>
+    <p:sldId id="302" r:id="rId53"/>
   </p:sldIdLst>
   <p:sldSz cx="9144000" cy="6858000" type="screen4x3"/>
   <p:notesSz cx="6858000" cy="9144000"/>
@@ -9907,11 +9908,7 @@
             </a:r>
             <a:r>
               <a:rPr lang="en-US" dirty="0" smtClean="0"/>
-              <a:t> here</a:t>
-            </a:r>
-            <a:r>
-              <a:rPr lang="en-US" dirty="0" smtClean="0"/>
-              <a:t>.</a:t>
+              <a:t> here.</a:t>
             </a:r>
             <a:endParaRPr lang="en-US" dirty="0"/>
           </a:p>
@@ -10824,11 +10821,7 @@
             </a:r>
             <a:r>
               <a:rPr lang="en-US" dirty="0" smtClean="0"/>
-              <a:t> distribution</a:t>
-            </a:r>
-            <a:r>
-              <a:rPr lang="en-US" dirty="0" smtClean="0"/>
-              <a:t>).</a:t>
+              <a:t> distribution).</a:t>
             </a:r>
           </a:p>
           <a:p>
@@ -10863,7 +10856,6 @@
               <a:rPr lang="en-US" dirty="0" smtClean="0"/>
               <a:t>that is fed into the negative binomial</a:t>
             </a:r>
-            <a:endParaRPr lang="en-US" dirty="0" smtClean="0"/>
           </a:p>
         </p:txBody>
       </p:sp>
@@ -10900,23 +10892,29 @@
         </p:nvSpPr>
         <p:spPr>
           <a:xfrm>
-            <a:off x="685800" y="-64532"/>
-            <a:ext cx="6172200" cy="369332"/>
-          </a:xfrm>
-          <a:prstGeom prst="rect">
-            <a:avLst/>
-          </a:prstGeom>
-          <a:noFill/>
-        </p:spPr>
-        <p:txBody>
-          <a:bodyPr wrap="square" rtlCol="0">
+            <a:off x="533400" y="152400"/>
+            <a:ext cx="7964232" cy="646331"/>
+          </a:xfrm>
+          <a:prstGeom prst="rect">
+            <a:avLst/>
+          </a:prstGeom>
+          <a:noFill/>
+        </p:spPr>
+        <p:txBody>
+          <a:bodyPr wrap="none" rtlCol="0">
             <a:spAutoFit/>
           </a:bodyPr>
           <a:lstStyle/>
           <a:p>
             <a:r>
               <a:rPr lang="en-US" dirty="0" smtClean="0"/>
-              <a:t>Finally, we are ready to perform inference</a:t>
+              <a:t>This procedure belongs in a long history of adding small constants to the variance…</a:t>
+            </a:r>
+          </a:p>
+          <a:p>
+            <a:r>
+              <a:rPr lang="en-US" dirty="0" smtClean="0"/>
+              <a:t>(which often seems poorly justified by theory…)</a:t>
             </a:r>
             <a:endParaRPr lang="en-US" dirty="0"/>
           </a:p>
@@ -10924,7 +10922,7 @@
       </p:sp>
       <p:pic>
         <p:nvPicPr>
-          <p:cNvPr id="11266" name="Picture 2"/>
+          <p:cNvPr id="4098" name="Picture 2"/>
           <p:cNvPicPr>
             <a:picLocks noChangeAspect="1" noChangeArrowheads="1"/>
           </p:cNvPicPr>
@@ -10939,8 +10937,8 @@
         </p:blipFill>
         <p:spPr bwMode="auto">
           <a:xfrm>
-            <a:off x="1219200" y="266700"/>
-            <a:ext cx="6610350" cy="2324100"/>
+            <a:off x="381000" y="838200"/>
+            <a:ext cx="3009900" cy="4010025"/>
           </a:xfrm>
           <a:prstGeom prst="rect">
             <a:avLst/>
@@ -10956,7 +10954,7 @@
       </p:pic>
       <p:pic>
         <p:nvPicPr>
-          <p:cNvPr id="11267" name="Picture 3"/>
+          <p:cNvPr id="4099" name="Picture 3"/>
           <p:cNvPicPr>
             <a:picLocks noChangeAspect="1" noChangeArrowheads="1"/>
           </p:cNvPicPr>
@@ -10971,8 +10969,8 @@
         </p:blipFill>
         <p:spPr bwMode="auto">
           <a:xfrm>
-            <a:off x="152400" y="2438400"/>
-            <a:ext cx="8001000" cy="3920133"/>
+            <a:off x="2209800" y="5181600"/>
+            <a:ext cx="6096000" cy="1438275"/>
           </a:xfrm>
           <a:prstGeom prst="rect">
             <a:avLst/>
@@ -10986,16 +10984,79 @@
           </a:ln>
         </p:spPr>
       </p:pic>
-      <p:sp>
-        <p:nvSpPr>
-          <p:cNvPr id="5" name="TextBox 4"/>
+      <p:cxnSp>
+        <p:nvCxnSpPr>
+          <p:cNvPr id="10" name="Straight Arrow Connector 9"/>
+          <p:cNvCxnSpPr/>
+          <p:nvPr/>
+        </p:nvCxnSpPr>
+        <p:spPr>
+          <a:xfrm flipH="1">
+            <a:off x="3124200" y="4800600"/>
+            <a:ext cx="533400" cy="0"/>
+          </a:xfrm>
+          <a:prstGeom prst="straightConnector1">
+            <a:avLst/>
+          </a:prstGeom>
+          <a:ln>
+            <a:tailEnd type="arrow"/>
+          </a:ln>
+        </p:spPr>
+        <p:style>
+          <a:lnRef idx="1">
+            <a:schemeClr val="accent1"/>
+          </a:lnRef>
+          <a:fillRef idx="0">
+            <a:schemeClr val="accent1"/>
+          </a:fillRef>
+          <a:effectRef idx="0">
+            <a:schemeClr val="accent1"/>
+          </a:effectRef>
+          <a:fontRef idx="minor">
+            <a:schemeClr val="tx1"/>
+          </a:fontRef>
+        </p:style>
+      </p:cxnSp>
+      <p:sp>
+        <p:nvSpPr>
+          <p:cNvPr id="11" name="TextBox 10"/>
           <p:cNvSpPr txBox="1"/>
           <p:nvPr/>
         </p:nvSpPr>
         <p:spPr>
-          <a:xfrm>
-            <a:off x="1066800" y="6412468"/>
-            <a:ext cx="6394892" cy="369332"/>
+          <a:xfrm flipH="1">
+            <a:off x="3581400" y="4572000"/>
+            <a:ext cx="4831081" cy="369332"/>
+          </a:xfrm>
+          <a:prstGeom prst="rect">
+            <a:avLst/>
+          </a:prstGeom>
+          <a:noFill/>
+        </p:spPr>
+        <p:txBody>
+          <a:bodyPr wrap="square" rtlCol="0">
+            <a:spAutoFit/>
+          </a:bodyPr>
+          <a:lstStyle/>
+          <a:p>
+            <a:r>
+              <a:rPr lang="en-US" dirty="0" smtClean="0"/>
+              <a:t>Adding an arbitrary damper to the variance</a:t>
+            </a:r>
+            <a:endParaRPr lang="en-US" dirty="0"/>
+          </a:p>
+        </p:txBody>
+      </p:sp>
+      <p:sp>
+        <p:nvSpPr>
+          <p:cNvPr id="12" name="TextBox 11"/>
+          <p:cNvSpPr txBox="1"/>
+          <p:nvPr/>
+        </p:nvSpPr>
+        <p:spPr>
+          <a:xfrm>
+            <a:off x="356422" y="5867400"/>
+            <a:ext cx="1700978" cy="369332"/>
           </a:xfrm>
           <a:prstGeom prst="rect">
             <a:avLst/>
@@ -11010,9 +11071,13 @@
           <a:p>
             <a:r>
               <a:rPr lang="en-US" dirty="0" smtClean="0"/>
-              <a:t>2 weeks vs. 12 weeks yields only 5 significant genes at a 10% FDR - </a:t>
-            </a:r>
-            <a:endParaRPr lang="en-US" dirty="0"/>
+              <a:t>(</a:t>
+            </a:r>
+            <a:r>
+              <a:rPr lang="en-US" smtClean="0"/>
+              <a:t>9,951 citations)</a:t>
+            </a:r>
+            <a:endParaRPr lang="en-US"/>
           </a:p>
         </p:txBody>
       </p:sp>
@@ -11041,9 +11106,39 @@
           <a:chExt cx="0" cy="0"/>
         </a:xfrm>
       </p:grpSpPr>
+      <p:sp>
+        <p:nvSpPr>
+          <p:cNvPr id="2" name="TextBox 1"/>
+          <p:cNvSpPr txBox="1"/>
+          <p:nvPr/>
+        </p:nvSpPr>
+        <p:spPr>
+          <a:xfrm>
+            <a:off x="685800" y="-64532"/>
+            <a:ext cx="6172200" cy="369332"/>
+          </a:xfrm>
+          <a:prstGeom prst="rect">
+            <a:avLst/>
+          </a:prstGeom>
+          <a:noFill/>
+        </p:spPr>
+        <p:txBody>
+          <a:bodyPr wrap="square" rtlCol="0">
+            <a:spAutoFit/>
+          </a:bodyPr>
+          <a:lstStyle/>
+          <a:p>
+            <a:r>
+              <a:rPr lang="en-US" dirty="0" smtClean="0"/>
+              <a:t>Finally, we are ready to perform inference</a:t>
+            </a:r>
+            <a:endParaRPr lang="en-US" dirty="0"/>
+          </a:p>
+        </p:txBody>
+      </p:sp>
       <p:pic>
         <p:nvPicPr>
-          <p:cNvPr id="12290" name="Picture 2"/>
+          <p:cNvPr id="11266" name="Picture 2"/>
           <p:cNvPicPr>
             <a:picLocks noChangeAspect="1" noChangeArrowheads="1"/>
           </p:cNvPicPr>
@@ -11058,8 +11153,8 @@
         </p:blipFill>
         <p:spPr bwMode="auto">
           <a:xfrm>
-            <a:off x="990600" y="762000"/>
-            <a:ext cx="3762375" cy="542925"/>
+            <a:off x="1219200" y="266700"/>
+            <a:ext cx="6610350" cy="2324100"/>
           </a:xfrm>
           <a:prstGeom prst="rect">
             <a:avLst/>
@@ -11073,39 +11168,9 @@
           </a:ln>
         </p:spPr>
       </p:pic>
-      <p:sp>
-        <p:nvSpPr>
-          <p:cNvPr id="3" name="TextBox 2"/>
-          <p:cNvSpPr txBox="1"/>
-          <p:nvPr/>
-        </p:nvSpPr>
-        <p:spPr>
-          <a:xfrm>
-            <a:off x="457200" y="152400"/>
-            <a:ext cx="7239000" cy="369332"/>
-          </a:xfrm>
-          <a:prstGeom prst="rect">
-            <a:avLst/>
-          </a:prstGeom>
-          <a:noFill/>
-        </p:spPr>
-        <p:txBody>
-          <a:bodyPr wrap="square" rtlCol="0">
-            <a:spAutoFit/>
-          </a:bodyPr>
-          <a:lstStyle/>
-          <a:p>
-            <a:r>
-              <a:rPr lang="en-US" dirty="0" smtClean="0"/>
-              <a:t>However day 2 vs. week 20 yields many more (136) significant genes </a:t>
-            </a:r>
-            <a:endParaRPr lang="en-US" dirty="0"/>
-          </a:p>
-        </p:txBody>
-      </p:sp>
       <p:pic>
         <p:nvPicPr>
-          <p:cNvPr id="12291" name="Picture 3"/>
+          <p:cNvPr id="11267" name="Picture 3"/>
           <p:cNvPicPr>
             <a:picLocks noChangeAspect="1" noChangeArrowheads="1"/>
           </p:cNvPicPr>
@@ -11120,8 +11185,8 @@
         </p:blipFill>
         <p:spPr bwMode="auto">
           <a:xfrm>
-            <a:off x="228600" y="1219200"/>
-            <a:ext cx="8639175" cy="4439833"/>
+            <a:off x="152400" y="2438400"/>
+            <a:ext cx="8001000" cy="3920133"/>
           </a:xfrm>
           <a:prstGeom prst="rect">
             <a:avLst/>
@@ -11135,38 +11200,36 @@
           </a:ln>
         </p:spPr>
       </p:pic>
-      <p:pic>
-        <p:nvPicPr>
-          <p:cNvPr id="12292" name="Picture 4"/>
-          <p:cNvPicPr>
-            <a:picLocks noChangeAspect="1" noChangeArrowheads="1"/>
-          </p:cNvPicPr>
-          <p:nvPr/>
-        </p:nvPicPr>
-        <p:blipFill>
-          <a:blip r:embed="rId4" cstate="print"/>
-          <a:srcRect/>
-          <a:stretch>
-            <a:fillRect/>
-          </a:stretch>
-        </p:blipFill>
-        <p:spPr bwMode="auto">
-          <a:xfrm>
-            <a:off x="762000" y="5867400"/>
-            <a:ext cx="3267075" cy="704850"/>
-          </a:xfrm>
-          <a:prstGeom prst="rect">
-            <a:avLst/>
-          </a:prstGeom>
-          <a:noFill/>
-          <a:ln w="9525">
-            <a:noFill/>
-            <a:miter lim="800000"/>
-            <a:headEnd/>
-            <a:tailEnd/>
-          </a:ln>
-        </p:spPr>
-      </p:pic>
+      <p:sp>
+        <p:nvSpPr>
+          <p:cNvPr id="5" name="TextBox 4"/>
+          <p:cNvSpPr txBox="1"/>
+          <p:nvPr/>
+        </p:nvSpPr>
+        <p:spPr>
+          <a:xfrm>
+            <a:off x="1066800" y="6412468"/>
+            <a:ext cx="6394892" cy="369332"/>
+          </a:xfrm>
+          <a:prstGeom prst="rect">
+            <a:avLst/>
+          </a:prstGeom>
+          <a:noFill/>
+        </p:spPr>
+        <p:txBody>
+          <a:bodyPr wrap="none" rtlCol="0">
+            <a:spAutoFit/>
+          </a:bodyPr>
+          <a:lstStyle/>
+          <a:p>
+            <a:r>
+              <a:rPr lang="en-US" dirty="0" smtClean="0"/>
+              <a:t>2 weeks vs. 12 weeks yields only 5 significant genes at a 10% FDR - </a:t>
+            </a:r>
+            <a:endParaRPr lang="en-US" dirty="0"/>
+          </a:p>
+        </p:txBody>
+      </p:sp>
     </p:spTree>
   </p:cSld>
   <p:clrMapOvr>
@@ -11192,92 +11255,132 @@
           <a:chExt cx="0" cy="0"/>
         </a:xfrm>
       </p:grpSpPr>
-      <p:sp>
-        <p:nvSpPr>
-          <p:cNvPr id="2" name="TextBox 1"/>
+      <p:pic>
+        <p:nvPicPr>
+          <p:cNvPr id="12290" name="Picture 2"/>
+          <p:cNvPicPr>
+            <a:picLocks noChangeAspect="1" noChangeArrowheads="1"/>
+          </p:cNvPicPr>
+          <p:nvPr/>
+        </p:nvPicPr>
+        <p:blipFill>
+          <a:blip r:embed="rId2" cstate="print"/>
+          <a:srcRect/>
+          <a:stretch>
+            <a:fillRect/>
+          </a:stretch>
+        </p:blipFill>
+        <p:spPr bwMode="auto">
+          <a:xfrm>
+            <a:off x="990600" y="762000"/>
+            <a:ext cx="3762375" cy="542925"/>
+          </a:xfrm>
+          <a:prstGeom prst="rect">
+            <a:avLst/>
+          </a:prstGeom>
+          <a:noFill/>
+          <a:ln w="9525">
+            <a:noFill/>
+            <a:miter lim="800000"/>
+            <a:headEnd/>
+            <a:tailEnd/>
+          </a:ln>
+        </p:spPr>
+      </p:pic>
+      <p:sp>
+        <p:nvSpPr>
+          <p:cNvPr id="3" name="TextBox 2"/>
           <p:cNvSpPr txBox="1"/>
           <p:nvPr/>
         </p:nvSpPr>
         <p:spPr>
           <a:xfrm>
-            <a:off x="228600" y="228600"/>
-            <a:ext cx="5619872" cy="1200329"/>
-          </a:xfrm>
-          <a:prstGeom prst="rect">
-            <a:avLst/>
-          </a:prstGeom>
-          <a:noFill/>
-        </p:spPr>
-        <p:txBody>
-          <a:bodyPr wrap="none" rtlCol="0">
+            <a:off x="457200" y="152400"/>
+            <a:ext cx="7239000" cy="369332"/>
+          </a:xfrm>
+          <a:prstGeom prst="rect">
+            <a:avLst/>
+          </a:prstGeom>
+          <a:noFill/>
+        </p:spPr>
+        <p:txBody>
+          <a:bodyPr wrap="square" rtlCol="0">
             <a:spAutoFit/>
           </a:bodyPr>
           <a:lstStyle/>
           <a:p>
             <a:r>
               <a:rPr lang="en-US" dirty="0" smtClean="0"/>
-              <a:t>P-values from two conditions under the negative binomial</a:t>
-            </a:r>
-          </a:p>
-          <a:p>
-            <a:r>
-              <a:rPr lang="en-US" dirty="0" smtClean="0"/>
-              <a:t>Pooling variance across samples of similar means</a:t>
-            </a:r>
-          </a:p>
-          <a:p>
-            <a:r>
-              <a:rPr lang="en-US" dirty="0" smtClean="0"/>
-              <a:t>Our example dataset through </a:t>
-            </a:r>
-            <a:r>
-              <a:rPr lang="en-US" dirty="0" err="1" smtClean="0"/>
-              <a:t>DeSeq</a:t>
-            </a:r>
-            <a:endParaRPr lang="en-US" dirty="0" smtClean="0"/>
-          </a:p>
-          <a:p>
-            <a:r>
-              <a:rPr lang="en-US" dirty="0" smtClean="0"/>
-              <a:t>False Discovery Rate</a:t>
+              <a:t>However day 2 vs. week 20 yields many more (136) significant genes </a:t>
             </a:r>
             <a:endParaRPr lang="en-US" dirty="0"/>
           </a:p>
         </p:txBody>
       </p:sp>
-      <p:cxnSp>
-        <p:nvCxnSpPr>
-          <p:cNvPr id="3" name="Straight Arrow Connector 2"/>
-          <p:cNvCxnSpPr/>
-          <p:nvPr/>
-        </p:nvCxnSpPr>
-        <p:spPr>
-          <a:xfrm flipH="1">
-            <a:off x="2286000" y="1219200"/>
-            <a:ext cx="685800" cy="0"/>
-          </a:xfrm>
-          <a:prstGeom prst="straightConnector1">
-            <a:avLst/>
-          </a:prstGeom>
-          <a:ln>
-            <a:tailEnd type="arrow"/>
+      <p:pic>
+        <p:nvPicPr>
+          <p:cNvPr id="12291" name="Picture 3"/>
+          <p:cNvPicPr>
+            <a:picLocks noChangeAspect="1" noChangeArrowheads="1"/>
+          </p:cNvPicPr>
+          <p:nvPr/>
+        </p:nvPicPr>
+        <p:blipFill>
+          <a:blip r:embed="rId3" cstate="print"/>
+          <a:srcRect/>
+          <a:stretch>
+            <a:fillRect/>
+          </a:stretch>
+        </p:blipFill>
+        <p:spPr bwMode="auto">
+          <a:xfrm>
+            <a:off x="228600" y="1219200"/>
+            <a:ext cx="8639175" cy="4439833"/>
+          </a:xfrm>
+          <a:prstGeom prst="rect">
+            <a:avLst/>
+          </a:prstGeom>
+          <a:noFill/>
+          <a:ln w="9525">
+            <a:noFill/>
+            <a:miter lim="800000"/>
+            <a:headEnd/>
+            <a:tailEnd/>
           </a:ln>
         </p:spPr>
-        <p:style>
-          <a:lnRef idx="1">
-            <a:schemeClr val="accent1"/>
-          </a:lnRef>
-          <a:fillRef idx="0">
-            <a:schemeClr val="accent1"/>
-          </a:fillRef>
-          <a:effectRef idx="0">
-            <a:schemeClr val="accent1"/>
-          </a:effectRef>
-          <a:fontRef idx="minor">
-            <a:schemeClr val="tx1"/>
-          </a:fontRef>
-        </p:style>
-      </p:cxnSp>
+      </p:pic>
+      <p:pic>
+        <p:nvPicPr>
+          <p:cNvPr id="12292" name="Picture 4"/>
+          <p:cNvPicPr>
+            <a:picLocks noChangeAspect="1" noChangeArrowheads="1"/>
+          </p:cNvPicPr>
+          <p:nvPr/>
+        </p:nvPicPr>
+        <p:blipFill>
+          <a:blip r:embed="rId4" cstate="print"/>
+          <a:srcRect/>
+          <a:stretch>
+            <a:fillRect/>
+          </a:stretch>
+        </p:blipFill>
+        <p:spPr bwMode="auto">
+          <a:xfrm>
+            <a:off x="762000" y="5867400"/>
+            <a:ext cx="3267075" cy="704850"/>
+          </a:xfrm>
+          <a:prstGeom prst="rect">
+            <a:avLst/>
+          </a:prstGeom>
+          <a:noFill/>
+          <a:ln w="9525">
+            <a:noFill/>
+            <a:miter lim="800000"/>
+            <a:headEnd/>
+            <a:tailEnd/>
+          </a:ln>
+        </p:spPr>
+      </p:pic>
     </p:spTree>
   </p:cSld>
   <p:clrMapOvr>
@@ -11305,165 +11408,90 @@
       </p:grpSpPr>
       <p:sp>
         <p:nvSpPr>
-          <p:cNvPr id="4" name="TextBox 3"/>
+          <p:cNvPr id="2" name="TextBox 1"/>
           <p:cNvSpPr txBox="1"/>
           <p:nvPr/>
         </p:nvSpPr>
         <p:spPr>
           <a:xfrm>
-            <a:off x="533400" y="609600"/>
-            <a:ext cx="6629400" cy="3416320"/>
-          </a:xfrm>
-          <a:prstGeom prst="rect">
-            <a:avLst/>
-          </a:prstGeom>
-          <a:noFill/>
-        </p:spPr>
-        <p:txBody>
-          <a:bodyPr wrap="square" rtlCol="0">
+            <a:off x="228600" y="228600"/>
+            <a:ext cx="5619872" cy="1200329"/>
+          </a:xfrm>
+          <a:prstGeom prst="rect">
+            <a:avLst/>
+          </a:prstGeom>
+          <a:noFill/>
+        </p:spPr>
+        <p:txBody>
+          <a:bodyPr wrap="none" rtlCol="0">
             <a:spAutoFit/>
           </a:bodyPr>
           <a:lstStyle/>
           <a:p>
             <a:r>
               <a:rPr lang="en-US" dirty="0" smtClean="0"/>
-              <a:t>You have 20,000 genes in an </a:t>
-            </a:r>
-            <a:r>
-              <a:rPr lang="en-US" dirty="0" err="1" smtClean="0"/>
-              <a:t>rna-seq</a:t>
-            </a:r>
-            <a:r>
-              <a:rPr lang="en-US" dirty="0" smtClean="0"/>
-              <a:t> experiment.</a:t>
-            </a:r>
-          </a:p>
-          <a:p>
-            <a:r>
-              <a:rPr lang="en-US" dirty="0" smtClean="0"/>
-              <a:t>You have two conditions (A) and (B).</a:t>
-            </a:r>
-          </a:p>
-          <a:p>
-            <a:r>
-              <a:rPr lang="en-US" dirty="0" smtClean="0"/>
-              <a:t>You run them through </a:t>
+              <a:t>P-values from two conditions under the negative binomial</a:t>
+            </a:r>
+          </a:p>
+          <a:p>
+            <a:r>
+              <a:rPr lang="en-US" dirty="0" smtClean="0"/>
+              <a:t>Pooling variance across samples of similar means</a:t>
+            </a:r>
+          </a:p>
+          <a:p>
+            <a:r>
+              <a:rPr lang="en-US" dirty="0" smtClean="0"/>
+              <a:t>Our example dataset through </a:t>
             </a:r>
             <a:r>
               <a:rPr lang="en-US" dirty="0" err="1" smtClean="0"/>
               <a:t>DeSeq</a:t>
             </a:r>
-            <a:r>
-              <a:rPr lang="en-US" dirty="0" smtClean="0"/>
-              <a:t> (or any other stats package).</a:t>
-            </a:r>
-          </a:p>
-          <a:p>
             <a:endParaRPr lang="en-US" dirty="0" smtClean="0"/>
           </a:p>
           <a:p>
             <a:r>
               <a:rPr lang="en-US" dirty="0" smtClean="0"/>
-              <a:t>If the null hypothesis is always true (no difference between A and B),</a:t>
-            </a:r>
-          </a:p>
-          <a:p>
-            <a:r>
-              <a:rPr lang="en-US" dirty="0" smtClean="0"/>
-              <a:t>the p-values will be uniformly distributed…</a:t>
-            </a:r>
-          </a:p>
-          <a:p>
-            <a:endParaRPr lang="en-US" dirty="0" smtClean="0"/>
-          </a:p>
-          <a:p>
-            <a:r>
-              <a:rPr lang="en-US" dirty="0" smtClean="0"/>
-              <a:t>We can model this pretty simply:</a:t>
-            </a:r>
-          </a:p>
-          <a:p>
-            <a:endParaRPr lang="en-US" dirty="0" smtClean="0"/>
-          </a:p>
-          <a:p>
-            <a:endParaRPr lang="en-US" dirty="0" smtClean="0"/>
-          </a:p>
-          <a:p>
-            <a:endParaRPr lang="en-US" dirty="0" smtClean="0"/>
-          </a:p>
-          <a:p>
-            <a:r>
-              <a:rPr lang="en-US" dirty="0" smtClean="0"/>
-              <a:t> </a:t>
+              <a:t>False Discovery Rate</a:t>
             </a:r>
             <a:endParaRPr lang="en-US" dirty="0"/>
           </a:p>
         </p:txBody>
       </p:sp>
-      <p:pic>
-        <p:nvPicPr>
-          <p:cNvPr id="1026" name="Picture 2"/>
-          <p:cNvPicPr>
-            <a:picLocks noChangeAspect="1" noChangeArrowheads="1"/>
-          </p:cNvPicPr>
-          <p:nvPr/>
-        </p:nvPicPr>
-        <p:blipFill>
-          <a:blip r:embed="rId2" cstate="print"/>
-          <a:srcRect/>
-          <a:stretch>
-            <a:fillRect/>
-          </a:stretch>
-        </p:blipFill>
-        <p:spPr bwMode="auto">
-          <a:xfrm>
-            <a:off x="609600" y="3733800"/>
-            <a:ext cx="3177396" cy="762000"/>
-          </a:xfrm>
-          <a:prstGeom prst="rect">
-            <a:avLst/>
-          </a:prstGeom>
-          <a:noFill/>
-          <a:ln w="9525">
-            <a:noFill/>
-            <a:miter lim="800000"/>
-            <a:headEnd/>
-            <a:tailEnd/>
+      <p:cxnSp>
+        <p:nvCxnSpPr>
+          <p:cNvPr id="3" name="Straight Arrow Connector 2"/>
+          <p:cNvCxnSpPr/>
+          <p:nvPr/>
+        </p:nvCxnSpPr>
+        <p:spPr>
+          <a:xfrm flipH="1">
+            <a:off x="2286000" y="1219200"/>
+            <a:ext cx="685800" cy="0"/>
+          </a:xfrm>
+          <a:prstGeom prst="straightConnector1">
+            <a:avLst/>
+          </a:prstGeom>
+          <a:ln>
+            <a:tailEnd type="arrow"/>
           </a:ln>
         </p:spPr>
-      </p:pic>
-      <p:pic>
-        <p:nvPicPr>
-          <p:cNvPr id="1027" name="Picture 3"/>
-          <p:cNvPicPr>
-            <a:picLocks noChangeAspect="1" noChangeArrowheads="1"/>
-          </p:cNvPicPr>
-          <p:nvPr/>
-        </p:nvPicPr>
-        <p:blipFill>
-          <a:blip r:embed="rId3" cstate="print"/>
-          <a:srcRect/>
-          <a:stretch>
-            <a:fillRect/>
-          </a:stretch>
-        </p:blipFill>
-        <p:spPr bwMode="auto">
-          <a:xfrm>
-            <a:off x="4114800" y="2667000"/>
-            <a:ext cx="4316101" cy="4043362"/>
-          </a:xfrm>
-          <a:prstGeom prst="rect">
-            <a:avLst/>
-          </a:prstGeom>
-          <a:noFill/>
-          <a:ln w="9525">
-            <a:noFill/>
-            <a:miter lim="800000"/>
-            <a:headEnd/>
-            <a:tailEnd/>
-          </a:ln>
-        </p:spPr>
-      </p:pic>
+        <p:style>
+          <a:lnRef idx="1">
+            <a:schemeClr val="accent1"/>
+          </a:lnRef>
+          <a:fillRef idx="0">
+            <a:schemeClr val="accent1"/>
+          </a:fillRef>
+          <a:effectRef idx="0">
+            <a:schemeClr val="accent1"/>
+          </a:effectRef>
+          <a:fontRef idx="minor">
+            <a:schemeClr val="tx1"/>
+          </a:fontRef>
+        </p:style>
+      </p:cxnSp>
     </p:spTree>
   </p:cSld>
   <p:clrMapOvr>
@@ -11497,60 +11525,98 @@
         </p:nvSpPr>
         <p:spPr>
           <a:xfrm>
-            <a:off x="838200" y="457200"/>
-            <a:ext cx="6247864" cy="1477328"/>
-          </a:xfrm>
-          <a:prstGeom prst="rect">
-            <a:avLst/>
-          </a:prstGeom>
-          <a:noFill/>
-        </p:spPr>
-        <p:txBody>
-          <a:bodyPr wrap="none" rtlCol="0">
+            <a:off x="533400" y="609600"/>
+            <a:ext cx="6629400" cy="3416320"/>
+          </a:xfrm>
+          <a:prstGeom prst="rect">
+            <a:avLst/>
+          </a:prstGeom>
+          <a:noFill/>
+        </p:spPr>
+        <p:txBody>
+          <a:bodyPr wrap="square" rtlCol="0">
             <a:spAutoFit/>
           </a:bodyPr>
           <a:lstStyle/>
           <a:p>
             <a:r>
               <a:rPr lang="en-US" dirty="0" smtClean="0"/>
-              <a:t>If we use a simple </a:t>
-            </a:r>
-            <a:r>
-              <a:rPr lang="en-US" dirty="0" smtClean="0">
-                <a:solidFill>
-                  <a:srgbClr val="FF0000"/>
-                </a:solidFill>
-              </a:rPr>
-              <a:t>threshold of significance </a:t>
-            </a:r>
-            <a:r>
-              <a:rPr lang="en-US" dirty="0" smtClean="0"/>
-              <a:t>of 0.05, we would </a:t>
-            </a:r>
-          </a:p>
-          <a:p>
-            <a:r>
-              <a:rPr lang="en-US" dirty="0" smtClean="0"/>
-              <a:t>expect about 1,000 genes to be called significant even if the null </a:t>
-            </a:r>
-          </a:p>
-          <a:p>
-            <a:r>
-              <a:rPr lang="en-US" dirty="0" smtClean="0"/>
-              <a:t>hypothesis were always true..</a:t>
+              <a:t>You have 20,000 genes in an </a:t>
+            </a:r>
+            <a:r>
+              <a:rPr lang="en-US" dirty="0" err="1" smtClean="0"/>
+              <a:t>rna-seq</a:t>
+            </a:r>
+            <a:r>
+              <a:rPr lang="en-US" dirty="0" smtClean="0"/>
+              <a:t> experiment.</a:t>
+            </a:r>
+          </a:p>
+          <a:p>
+            <a:r>
+              <a:rPr lang="en-US" dirty="0" smtClean="0"/>
+              <a:t>You have two conditions (A) and (B).</a:t>
+            </a:r>
+          </a:p>
+          <a:p>
+            <a:r>
+              <a:rPr lang="en-US" dirty="0" smtClean="0"/>
+              <a:t>You run them through </a:t>
+            </a:r>
+            <a:r>
+              <a:rPr lang="en-US" dirty="0" err="1" smtClean="0"/>
+              <a:t>DeSeq</a:t>
+            </a:r>
+            <a:r>
+              <a:rPr lang="en-US" dirty="0" smtClean="0"/>
+              <a:t> (or any other stats package).</a:t>
             </a:r>
           </a:p>
           <a:p>
             <a:endParaRPr lang="en-US" dirty="0" smtClean="0"/>
           </a:p>
           <a:p>
+            <a:r>
+              <a:rPr lang="en-US" dirty="0" smtClean="0"/>
+              <a:t>If the null hypothesis is always true (no difference between A and B),</a:t>
+            </a:r>
+          </a:p>
+          <a:p>
+            <a:r>
+              <a:rPr lang="en-US" dirty="0" smtClean="0"/>
+              <a:t>the p-values will be uniformly distributed…</a:t>
+            </a:r>
+          </a:p>
+          <a:p>
+            <a:endParaRPr lang="en-US" dirty="0" smtClean="0"/>
+          </a:p>
+          <a:p>
+            <a:r>
+              <a:rPr lang="en-US" dirty="0" smtClean="0"/>
+              <a:t>We can model this pretty simply:</a:t>
+            </a:r>
+          </a:p>
+          <a:p>
+            <a:endParaRPr lang="en-US" dirty="0" smtClean="0"/>
+          </a:p>
+          <a:p>
+            <a:endParaRPr lang="en-US" dirty="0" smtClean="0"/>
+          </a:p>
+          <a:p>
+            <a:endParaRPr lang="en-US" dirty="0" smtClean="0"/>
+          </a:p>
+          <a:p>
+            <a:r>
+              <a:rPr lang="en-US" dirty="0" smtClean="0"/>
+              <a:t> </a:t>
+            </a:r>
             <a:endParaRPr lang="en-US" dirty="0"/>
           </a:p>
         </p:txBody>
       </p:sp>
       <p:pic>
         <p:nvPicPr>
-          <p:cNvPr id="2050" name="Picture 2"/>
+          <p:cNvPr id="1026" name="Picture 2"/>
           <p:cNvPicPr>
             <a:picLocks noChangeAspect="1" noChangeArrowheads="1"/>
           </p:cNvPicPr>
@@ -11565,8 +11631,8 @@
         </p:blipFill>
         <p:spPr bwMode="auto">
           <a:xfrm>
-            <a:off x="914400" y="1828800"/>
-            <a:ext cx="2200275" cy="1466850"/>
+            <a:off x="609600" y="3733800"/>
+            <a:ext cx="3177396" cy="762000"/>
           </a:xfrm>
           <a:prstGeom prst="rect">
             <a:avLst/>
@@ -11580,75 +11646,38 @@
           </a:ln>
         </p:spPr>
       </p:pic>
-      <p:sp>
-        <p:nvSpPr>
-          <p:cNvPr id="6" name="TextBox 5"/>
-          <p:cNvSpPr txBox="1"/>
-          <p:nvPr/>
-        </p:nvSpPr>
-        <p:spPr>
-          <a:xfrm>
-            <a:off x="2209800" y="3212068"/>
-            <a:ext cx="4613442" cy="646331"/>
-          </a:xfrm>
-          <a:prstGeom prst="rect">
-            <a:avLst/>
-          </a:prstGeom>
-          <a:noFill/>
-        </p:spPr>
-        <p:txBody>
-          <a:bodyPr wrap="none" rtlCol="0">
-            <a:spAutoFit/>
-          </a:bodyPr>
-          <a:lstStyle/>
-          <a:p>
-            <a:r>
-              <a:rPr lang="en-US" dirty="0" smtClean="0"/>
-              <a:t>There are 1,016 genes that have p-values &lt;0.05</a:t>
-            </a:r>
-          </a:p>
-          <a:p>
-            <a:r>
-              <a:rPr lang="en-US" dirty="0" smtClean="0"/>
-              <a:t>in this case where the p-values are uniform</a:t>
-            </a:r>
-            <a:endParaRPr lang="en-US" dirty="0"/>
-          </a:p>
-        </p:txBody>
-      </p:sp>
-      <p:cxnSp>
-        <p:nvCxnSpPr>
-          <p:cNvPr id="8" name="Straight Arrow Connector 7"/>
-          <p:cNvCxnSpPr/>
-          <p:nvPr/>
-        </p:nvCxnSpPr>
-        <p:spPr>
-          <a:xfrm rot="10800000">
-            <a:off x="1676400" y="3048000"/>
-            <a:ext cx="533400" cy="304800"/>
-          </a:xfrm>
-          <a:prstGeom prst="straightConnector1">
-            <a:avLst/>
-          </a:prstGeom>
-          <a:ln>
-            <a:tailEnd type="arrow"/>
+      <p:pic>
+        <p:nvPicPr>
+          <p:cNvPr id="1027" name="Picture 3"/>
+          <p:cNvPicPr>
+            <a:picLocks noChangeAspect="1" noChangeArrowheads="1"/>
+          </p:cNvPicPr>
+          <p:nvPr/>
+        </p:nvPicPr>
+        <p:blipFill>
+          <a:blip r:embed="rId3" cstate="print"/>
+          <a:srcRect/>
+          <a:stretch>
+            <a:fillRect/>
+          </a:stretch>
+        </p:blipFill>
+        <p:spPr bwMode="auto">
+          <a:xfrm>
+            <a:off x="4114800" y="2667000"/>
+            <a:ext cx="4316101" cy="4043362"/>
+          </a:xfrm>
+          <a:prstGeom prst="rect">
+            <a:avLst/>
+          </a:prstGeom>
+          <a:noFill/>
+          <a:ln w="9525">
+            <a:noFill/>
+            <a:miter lim="800000"/>
+            <a:headEnd/>
+            <a:tailEnd/>
           </a:ln>
         </p:spPr>
-        <p:style>
-          <a:lnRef idx="1">
-            <a:schemeClr val="accent1"/>
-          </a:lnRef>
-          <a:fillRef idx="0">
-            <a:schemeClr val="accent1"/>
-          </a:fillRef>
-          <a:effectRef idx="0">
-            <a:schemeClr val="accent1"/>
-          </a:effectRef>
-          <a:fontRef idx="minor">
-            <a:schemeClr val="tx1"/>
-          </a:fontRef>
-        </p:style>
-      </p:cxnSp>
+      </p:pic>
     </p:spTree>
   </p:cSld>
   <p:clrMapOvr>
@@ -11682,8 +11711,8 @@
         </p:nvSpPr>
         <p:spPr>
           <a:xfrm>
-            <a:off x="609600" y="533400"/>
-            <a:ext cx="5702459" cy="2862322"/>
+            <a:off x="838200" y="457200"/>
+            <a:ext cx="6247864" cy="1477328"/>
           </a:xfrm>
           <a:prstGeom prst="rect">
             <a:avLst/>
@@ -11698,46 +11727,32 @@
           <a:p>
             <a:r>
               <a:rPr lang="en-US" dirty="0" smtClean="0"/>
-              <a:t>One alternative:</a:t>
-            </a:r>
-          </a:p>
-          <a:p>
-            <a:endParaRPr lang="en-US" dirty="0" smtClean="0"/>
-          </a:p>
-          <a:p>
-            <a:r>
-              <a:rPr lang="en-US" dirty="0" smtClean="0"/>
-              <a:t>	Use as a p-value threshold </a:t>
-            </a:r>
-            <a:r>
-              <a:rPr lang="en-US" dirty="0" err="1" smtClean="0"/>
-              <a:t>Bonferroni</a:t>
-            </a:r>
-            <a:r>
-              <a:rPr lang="en-US" dirty="0" smtClean="0"/>
-              <a:t> correction.</a:t>
-            </a:r>
-          </a:p>
-          <a:p>
-            <a:endParaRPr lang="en-US" dirty="0" smtClean="0"/>
-          </a:p>
-          <a:p>
-            <a:r>
-              <a:rPr lang="en-US" dirty="0" smtClean="0"/>
-              <a:t>	The desired threshold / number of tests.</a:t>
-            </a:r>
-          </a:p>
-          <a:p>
-            <a:endParaRPr lang="en-US" dirty="0" smtClean="0"/>
-          </a:p>
-          <a:p>
-            <a:r>
-              <a:rPr lang="en-US" dirty="0" smtClean="0"/>
-              <a:t>	In this case  0.05 / 20000  =  2.5e-06</a:t>
-            </a:r>
-          </a:p>
-          <a:p>
-            <a:endParaRPr lang="en-US" dirty="0" smtClean="0"/>
+              <a:t>If we use a simple </a:t>
+            </a:r>
+            <a:r>
+              <a:rPr lang="en-US" dirty="0" smtClean="0">
+                <a:solidFill>
+                  <a:srgbClr val="FF0000"/>
+                </a:solidFill>
+              </a:rPr>
+              <a:t>threshold of significance </a:t>
+            </a:r>
+            <a:r>
+              <a:rPr lang="en-US" dirty="0" smtClean="0"/>
+              <a:t>of 0.05, we would </a:t>
+            </a:r>
+          </a:p>
+          <a:p>
+            <a:r>
+              <a:rPr lang="en-US" dirty="0" smtClean="0"/>
+              <a:t>expect about 1,000 genes to be called significant even if the null </a:t>
+            </a:r>
+          </a:p>
+          <a:p>
+            <a:r>
+              <a:rPr lang="en-US" dirty="0" smtClean="0"/>
+              <a:t>hypothesis were always true..</a:t>
+            </a:r>
           </a:p>
           <a:p>
             <a:endParaRPr lang="en-US" dirty="0" smtClean="0"/>
@@ -11749,7 +11764,7 @@
       </p:sp>
       <p:pic>
         <p:nvPicPr>
-          <p:cNvPr id="3074" name="Picture 2"/>
+          <p:cNvPr id="2050" name="Picture 2"/>
           <p:cNvPicPr>
             <a:picLocks noChangeAspect="1" noChangeArrowheads="1"/>
           </p:cNvPicPr>
@@ -11764,8 +11779,8 @@
         </p:blipFill>
         <p:spPr bwMode="auto">
           <a:xfrm>
-            <a:off x="609600" y="2971800"/>
-            <a:ext cx="2809875" cy="2314575"/>
+            <a:off x="914400" y="1828800"/>
+            <a:ext cx="2200275" cy="1466850"/>
           </a:xfrm>
           <a:prstGeom prst="rect">
             <a:avLst/>
@@ -11779,48 +11794,16 @@
           </a:ln>
         </p:spPr>
       </p:pic>
-      <p:pic>
-        <p:nvPicPr>
-          <p:cNvPr id="3075" name="Picture 3"/>
-          <p:cNvPicPr>
-            <a:picLocks noChangeAspect="1" noChangeArrowheads="1"/>
-          </p:cNvPicPr>
-          <p:nvPr/>
-        </p:nvPicPr>
-        <p:blipFill>
-          <a:blip r:embed="rId3" cstate="print"/>
-          <a:srcRect/>
-          <a:stretch>
-            <a:fillRect/>
-          </a:stretch>
-        </p:blipFill>
-        <p:spPr bwMode="auto">
-          <a:xfrm>
-            <a:off x="533400" y="5334000"/>
-            <a:ext cx="5743575" cy="742950"/>
-          </a:xfrm>
-          <a:prstGeom prst="rect">
-            <a:avLst/>
-          </a:prstGeom>
-          <a:noFill/>
-          <a:ln w="9525">
-            <a:noFill/>
-            <a:miter lim="800000"/>
-            <a:headEnd/>
-            <a:tailEnd/>
-          </a:ln>
-        </p:spPr>
-      </p:pic>
-      <p:sp>
-        <p:nvSpPr>
-          <p:cNvPr id="7" name="TextBox 6"/>
+      <p:sp>
+        <p:nvSpPr>
+          <p:cNvPr id="6" name="TextBox 5"/>
           <p:cNvSpPr txBox="1"/>
           <p:nvPr/>
         </p:nvSpPr>
         <p:spPr>
           <a:xfrm>
-            <a:off x="3048000" y="4038600"/>
-            <a:ext cx="3951916" cy="369332"/>
+            <a:off x="2209800" y="3212068"/>
+            <a:ext cx="4613442" cy="646331"/>
           </a:xfrm>
           <a:prstGeom prst="rect">
             <a:avLst/>
@@ -11835,62 +11818,51 @@
           <a:p>
             <a:r>
               <a:rPr lang="en-US" dirty="0" smtClean="0"/>
-              <a:t>None of our p-</a:t>
-            </a:r>
-            <a:r>
-              <a:rPr lang="en-US" dirty="0" err="1" smtClean="0"/>
-              <a:t>vals</a:t>
-            </a:r>
-            <a:r>
-              <a:rPr lang="en-US" dirty="0" smtClean="0"/>
-              <a:t> reach this threshold..</a:t>
+              <a:t>There are 1,016 genes that have p-values &lt;0.05</a:t>
+            </a:r>
+          </a:p>
+          <a:p>
+            <a:r>
+              <a:rPr lang="en-US" dirty="0" smtClean="0"/>
+              <a:t>in this case where the p-values are uniform</a:t>
             </a:r>
             <a:endParaRPr lang="en-US" dirty="0"/>
           </a:p>
         </p:txBody>
       </p:sp>
-      <p:sp>
-        <p:nvSpPr>
-          <p:cNvPr id="8" name="TextBox 7"/>
-          <p:cNvSpPr txBox="1"/>
-          <p:nvPr/>
-        </p:nvSpPr>
-        <p:spPr>
-          <a:xfrm>
-            <a:off x="685800" y="6248400"/>
-            <a:ext cx="5759462" cy="369332"/>
-          </a:xfrm>
-          <a:prstGeom prst="rect">
-            <a:avLst/>
-          </a:prstGeom>
-          <a:noFill/>
-        </p:spPr>
-        <p:txBody>
-          <a:bodyPr wrap="none" rtlCol="0">
-            <a:spAutoFit/>
-          </a:bodyPr>
-          <a:lstStyle/>
-          <a:p>
-            <a:r>
-              <a:rPr lang="en-US" dirty="0" smtClean="0"/>
-              <a:t>At this threshold, there is a 5% chance of </a:t>
-            </a:r>
-            <a:r>
-              <a:rPr lang="en-US" dirty="0" smtClean="0">
-                <a:solidFill>
-                  <a:srgbClr val="FF0000"/>
-                </a:solidFill>
-              </a:rPr>
-              <a:t>any</a:t>
-            </a:r>
-            <a:r>
-              <a:rPr lang="en-US" dirty="0" smtClean="0"/>
-              <a:t> false positives </a:t>
-            </a:r>
-            <a:endParaRPr lang="en-US" dirty="0"/>
-          </a:p>
-        </p:txBody>
-      </p:sp>
+      <p:cxnSp>
+        <p:nvCxnSpPr>
+          <p:cNvPr id="8" name="Straight Arrow Connector 7"/>
+          <p:cNvCxnSpPr/>
+          <p:nvPr/>
+        </p:nvCxnSpPr>
+        <p:spPr>
+          <a:xfrm rot="10800000">
+            <a:off x="1676400" y="3048000"/>
+            <a:ext cx="533400" cy="304800"/>
+          </a:xfrm>
+          <a:prstGeom prst="straightConnector1">
+            <a:avLst/>
+          </a:prstGeom>
+          <a:ln>
+            <a:tailEnd type="arrow"/>
+          </a:ln>
+        </p:spPr>
+        <p:style>
+          <a:lnRef idx="1">
+            <a:schemeClr val="accent1"/>
+          </a:lnRef>
+          <a:fillRef idx="0">
+            <a:schemeClr val="accent1"/>
+          </a:fillRef>
+          <a:effectRef idx="0">
+            <a:schemeClr val="accent1"/>
+          </a:effectRef>
+          <a:fontRef idx="minor">
+            <a:schemeClr val="tx1"/>
+          </a:fontRef>
+        </p:style>
+      </p:cxnSp>
     </p:spTree>
   </p:cSld>
   <p:clrMapOvr>
@@ -11918,44 +11890,46 @@
       </p:grpSpPr>
       <p:sp>
         <p:nvSpPr>
-          <p:cNvPr id="4" name="Rectangle 3"/>
-          <p:cNvSpPr/>
-          <p:nvPr/>
-        </p:nvSpPr>
-        <p:spPr>
-          <a:xfrm>
-            <a:off x="304800" y="228600"/>
-            <a:ext cx="8715014" cy="3139321"/>
-          </a:xfrm>
-          <a:prstGeom prst="rect">
-            <a:avLst/>
-          </a:prstGeom>
-        </p:spPr>
-        <p:txBody>
-          <a:bodyPr wrap="none">
+          <p:cNvPr id="4" name="TextBox 3"/>
+          <p:cNvSpPr txBox="1"/>
+          <p:nvPr/>
+        </p:nvSpPr>
+        <p:spPr>
+          <a:xfrm>
+            <a:off x="609600" y="533400"/>
+            <a:ext cx="5702459" cy="2862322"/>
+          </a:xfrm>
+          <a:prstGeom prst="rect">
+            <a:avLst/>
+          </a:prstGeom>
+          <a:noFill/>
+        </p:spPr>
+        <p:txBody>
+          <a:bodyPr wrap="none" rtlCol="0">
             <a:spAutoFit/>
           </a:bodyPr>
           <a:lstStyle/>
           <a:p>
             <a:r>
+              <a:rPr lang="en-US" dirty="0" smtClean="0"/>
+              <a:t>One alternative:</a:t>
+            </a:r>
+          </a:p>
+          <a:p>
+            <a:endParaRPr lang="en-US" dirty="0" smtClean="0"/>
+          </a:p>
+          <a:p>
+            <a:r>
+              <a:rPr lang="en-US" dirty="0" smtClean="0"/>
+              <a:t>	Use as a p-value threshold </a:t>
+            </a:r>
+            <a:r>
               <a:rPr lang="en-US" dirty="0" err="1" smtClean="0"/>
               <a:t>Bonferroni</a:t>
             </a:r>
             <a:r>
               <a:rPr lang="en-US" dirty="0" smtClean="0"/>
-              <a:t> correction is sometimes considered </a:t>
-            </a:r>
-            <a:r>
-              <a:rPr lang="en-US" dirty="0" smtClean="0">
-                <a:solidFill>
-                  <a:srgbClr val="FF0000"/>
-                </a:solidFill>
-              </a:rPr>
-              <a:t>too conservative </a:t>
-            </a:r>
-            <a:r>
-              <a:rPr lang="en-US" dirty="0" smtClean="0"/>
-              <a:t>for genomics experiments.</a:t>
+              <a:t> correction.</a:t>
             </a:r>
           </a:p>
           <a:p>
@@ -11964,58 +11938,156 @@
           <a:p>
             <a:r>
               <a:rPr lang="en-US" dirty="0" smtClean="0"/>
-              <a:t>At small sample sizes, you might have few genes with p-values smaller than the </a:t>
-            </a:r>
-          </a:p>
-          <a:p>
+              <a:t>	The desired threshold / number of tests.</a:t>
+            </a:r>
+          </a:p>
+          <a:p>
+            <a:endParaRPr lang="en-US" dirty="0" smtClean="0"/>
+          </a:p>
+          <a:p>
+            <a:r>
+              <a:rPr lang="en-US" dirty="0" smtClean="0"/>
+              <a:t>	In this case  0.05 / 20000  =  2.5e-06</a:t>
+            </a:r>
+          </a:p>
+          <a:p>
+            <a:endParaRPr lang="en-US" dirty="0" smtClean="0"/>
+          </a:p>
+          <a:p>
+            <a:endParaRPr lang="en-US" dirty="0" smtClean="0"/>
+          </a:p>
+          <a:p>
+            <a:endParaRPr lang="en-US" dirty="0"/>
+          </a:p>
+        </p:txBody>
+      </p:sp>
+      <p:pic>
+        <p:nvPicPr>
+          <p:cNvPr id="3074" name="Picture 2"/>
+          <p:cNvPicPr>
+            <a:picLocks noChangeAspect="1" noChangeArrowheads="1"/>
+          </p:cNvPicPr>
+          <p:nvPr/>
+        </p:nvPicPr>
+        <p:blipFill>
+          <a:blip r:embed="rId2" cstate="print"/>
+          <a:srcRect/>
+          <a:stretch>
+            <a:fillRect/>
+          </a:stretch>
+        </p:blipFill>
+        <p:spPr bwMode="auto">
+          <a:xfrm>
+            <a:off x="609600" y="2971800"/>
+            <a:ext cx="2809875" cy="2314575"/>
+          </a:xfrm>
+          <a:prstGeom prst="rect">
+            <a:avLst/>
+          </a:prstGeom>
+          <a:noFill/>
+          <a:ln w="9525">
+            <a:noFill/>
+            <a:miter lim="800000"/>
+            <a:headEnd/>
+            <a:tailEnd/>
+          </a:ln>
+        </p:spPr>
+      </p:pic>
+      <p:pic>
+        <p:nvPicPr>
+          <p:cNvPr id="3075" name="Picture 3"/>
+          <p:cNvPicPr>
+            <a:picLocks noChangeAspect="1" noChangeArrowheads="1"/>
+          </p:cNvPicPr>
+          <p:nvPr/>
+        </p:nvPicPr>
+        <p:blipFill>
+          <a:blip r:embed="rId3" cstate="print"/>
+          <a:srcRect/>
+          <a:stretch>
+            <a:fillRect/>
+          </a:stretch>
+        </p:blipFill>
+        <p:spPr bwMode="auto">
+          <a:xfrm>
+            <a:off x="533400" y="5334000"/>
+            <a:ext cx="5743575" cy="742950"/>
+          </a:xfrm>
+          <a:prstGeom prst="rect">
+            <a:avLst/>
+          </a:prstGeom>
+          <a:noFill/>
+          <a:ln w="9525">
+            <a:noFill/>
+            <a:miter lim="800000"/>
+            <a:headEnd/>
+            <a:tailEnd/>
+          </a:ln>
+        </p:spPr>
+      </p:pic>
+      <p:sp>
+        <p:nvSpPr>
+          <p:cNvPr id="7" name="TextBox 6"/>
+          <p:cNvSpPr txBox="1"/>
+          <p:nvPr/>
+        </p:nvSpPr>
+        <p:spPr>
+          <a:xfrm>
+            <a:off x="3048000" y="4038600"/>
+            <a:ext cx="3951916" cy="369332"/>
+          </a:xfrm>
+          <a:prstGeom prst="rect">
+            <a:avLst/>
+          </a:prstGeom>
+          <a:noFill/>
+        </p:spPr>
+        <p:txBody>
+          <a:bodyPr wrap="none" rtlCol="0">
+            <a:spAutoFit/>
+          </a:bodyPr>
+          <a:lstStyle/>
+          <a:p>
+            <a:r>
+              <a:rPr lang="en-US" dirty="0" smtClean="0"/>
+              <a:t>None of our p-</a:t>
+            </a:r>
             <a:r>
               <a:rPr lang="en-US" dirty="0" err="1" smtClean="0"/>
-              <a:t>Bonferroni</a:t>
-            </a:r>
-            <a:r>
-              <a:rPr lang="en-US" dirty="0" smtClean="0"/>
-              <a:t> thresholds.</a:t>
-            </a:r>
-          </a:p>
-          <a:p>
-            <a:endParaRPr lang="en-US" dirty="0" smtClean="0"/>
-          </a:p>
-          <a:p>
-            <a:r>
-              <a:rPr lang="en-US" dirty="0" smtClean="0"/>
-              <a:t>A less conservative alternative, false discovery rate.</a:t>
-            </a:r>
-          </a:p>
-          <a:p>
-            <a:endParaRPr lang="en-US" dirty="0" smtClean="0"/>
-          </a:p>
-          <a:p>
-            <a:r>
-              <a:rPr lang="en-US" dirty="0" smtClean="0"/>
-              <a:t>At a 5% false discovery rate, we expect 5% of our hits to be false positives.</a:t>
-            </a:r>
-          </a:p>
-          <a:p>
-            <a:endParaRPr lang="en-US" dirty="0" smtClean="0"/>
-          </a:p>
-          <a:p>
-            <a:r>
-              <a:rPr lang="en-US" dirty="0" smtClean="0"/>
-              <a:t>This is less conservative than </a:t>
-            </a:r>
-            <a:r>
-              <a:rPr lang="en-US" dirty="0" err="1" smtClean="0"/>
-              <a:t>Bonferroni</a:t>
-            </a:r>
-            <a:r>
-              <a:rPr lang="en-US" dirty="0" smtClean="0"/>
-              <a:t> correction, where there is a 5% chance</a:t>
-            </a:r>
-          </a:p>
-          <a:p>
-            <a:r>
-              <a:rPr lang="en-US" dirty="0" smtClean="0"/>
-              <a:t>that </a:t>
+              <a:t>vals</a:t>
+            </a:r>
+            <a:r>
+              <a:rPr lang="en-US" dirty="0" smtClean="0"/>
+              <a:t> reach this threshold..</a:t>
+            </a:r>
+            <a:endParaRPr lang="en-US" dirty="0"/>
+          </a:p>
+        </p:txBody>
+      </p:sp>
+      <p:sp>
+        <p:nvSpPr>
+          <p:cNvPr id="8" name="TextBox 7"/>
+          <p:cNvSpPr txBox="1"/>
+          <p:nvPr/>
+        </p:nvSpPr>
+        <p:spPr>
+          <a:xfrm>
+            <a:off x="685800" y="6248400"/>
+            <a:ext cx="5759462" cy="369332"/>
+          </a:xfrm>
+          <a:prstGeom prst="rect">
+            <a:avLst/>
+          </a:prstGeom>
+          <a:noFill/>
+        </p:spPr>
+        <p:txBody>
+          <a:bodyPr wrap="none" rtlCol="0">
+            <a:spAutoFit/>
+          </a:bodyPr>
+          <a:lstStyle/>
+          <a:p>
+            <a:r>
+              <a:rPr lang="en-US" dirty="0" smtClean="0"/>
+              <a:t>At this threshold, there is a 5% chance of </a:t>
             </a:r>
             <a:r>
               <a:rPr lang="en-US" dirty="0" smtClean="0">
@@ -12027,7 +12099,7 @@
             </a:r>
             <a:r>
               <a:rPr lang="en-US" dirty="0" smtClean="0"/>
-              <a:t> of our hits are false positives.</a:t>
+              <a:t> false positives </a:t>
             </a:r>
             <a:endParaRPr lang="en-US" dirty="0"/>
           </a:p>
@@ -12060,29 +12132,44 @@
       </p:grpSpPr>
       <p:sp>
         <p:nvSpPr>
-          <p:cNvPr id="4" name="TextBox 3"/>
-          <p:cNvSpPr txBox="1"/>
-          <p:nvPr/>
-        </p:nvSpPr>
-        <p:spPr>
-          <a:xfrm flipH="1">
-            <a:off x="380998" y="228600"/>
-            <a:ext cx="7696201" cy="3416320"/>
-          </a:xfrm>
-          <a:prstGeom prst="rect">
-            <a:avLst/>
-          </a:prstGeom>
-          <a:noFill/>
-        </p:spPr>
-        <p:txBody>
-          <a:bodyPr wrap="square" rtlCol="0">
+          <p:cNvPr id="4" name="Rectangle 3"/>
+          <p:cNvSpPr/>
+          <p:nvPr/>
+        </p:nvSpPr>
+        <p:spPr>
+          <a:xfrm>
+            <a:off x="304800" y="228600"/>
+            <a:ext cx="8715014" cy="3139321"/>
+          </a:xfrm>
+          <a:prstGeom prst="rect">
+            <a:avLst/>
+          </a:prstGeom>
+        </p:spPr>
+        <p:txBody>
+          <a:bodyPr wrap="none">
             <a:spAutoFit/>
           </a:bodyPr>
           <a:lstStyle/>
           <a:p>
             <a:r>
-              <a:rPr lang="en-US" dirty="0" smtClean="0"/>
-              <a:t>One straight-forward approach to finding genes at a given false-discovery rate</a:t>
+              <a:rPr lang="en-US" dirty="0" err="1" smtClean="0"/>
+              <a:t>Bonferroni</a:t>
+            </a:r>
+            <a:r>
+              <a:rPr lang="en-US" dirty="0" smtClean="0"/>
+              <a:t> correction is sometimes considered </a:t>
+            </a:r>
+            <a:r>
+              <a:rPr lang="en-US" dirty="0" smtClean="0">
+                <a:solidFill>
+                  <a:srgbClr val="FF0000"/>
+                </a:solidFill>
+              </a:rPr>
+              <a:t>too conservative </a:t>
+            </a:r>
+            <a:r>
+              <a:rPr lang="en-US" dirty="0" smtClean="0"/>
+              <a:t>for genomics experiments.</a:t>
             </a:r>
           </a:p>
           <a:p>
@@ -12090,12 +12177,18 @@
           </a:p>
           <a:p>
             <a:r>
+              <a:rPr lang="en-US" dirty="0" smtClean="0"/>
+              <a:t>At small sample sizes, you might have few genes with p-values smaller than the </a:t>
+            </a:r>
+          </a:p>
+          <a:p>
+            <a:r>
               <a:rPr lang="en-US" dirty="0" err="1" smtClean="0"/>
-              <a:t>Benjamini</a:t>
-            </a:r>
-            <a:r>
-              <a:rPr lang="en-US" dirty="0" smtClean="0"/>
-              <a:t> and Hochberg FDR</a:t>
+              <a:t>Bonferroni</a:t>
+            </a:r>
+            <a:r>
+              <a:rPr lang="en-US" dirty="0" smtClean="0"/>
+              <a:t> thresholds.</a:t>
             </a:r>
           </a:p>
           <a:p>
@@ -12104,7 +12197,7 @@
           <a:p>
             <a:r>
               <a:rPr lang="en-US" dirty="0" smtClean="0"/>
-              <a:t>	1.  Rank all the p-values (smallest first).  The rank of each value = K</a:t>
+              <a:t>A less conservative alternative, false discovery rate.</a:t>
             </a:r>
           </a:p>
           <a:p>
@@ -12113,19 +12206,7 @@
           <a:p>
             <a:r>
               <a:rPr lang="en-US" dirty="0" smtClean="0"/>
-              <a:t>	2.  Calculate N * p / k </a:t>
-            </a:r>
-          </a:p>
-          <a:p>
-            <a:r>
-              <a:rPr lang="en-US" dirty="0" smtClean="0"/>
-              <a:t>		where N = the # of hypotheses that you are testing</a:t>
-            </a:r>
-          </a:p>
-          <a:p>
-            <a:r>
-              <a:rPr lang="en-US" dirty="0" smtClean="0"/>
-              <a:t>		             p = the “raw” (uncorrected) p-value.</a:t>
+              <a:t>At a 5% false discovery rate, we expect 5% of our hits to be false positives.</a:t>
             </a:r>
           </a:p>
           <a:p>
@@ -12134,113 +12215,33 @@
           <a:p>
             <a:r>
               <a:rPr lang="en-US" dirty="0" smtClean="0"/>
-              <a:t>	3.  Start at the top of the list.  Go down to N * p / k &gt; threshold </a:t>
-            </a:r>
-          </a:p>
-          <a:p>
-            <a:r>
-              <a:rPr lang="en-US" dirty="0" smtClean="0"/>
-              <a:t>		(e.g. 0.10 for 10% FDR). </a:t>
-            </a:r>
-            <a:endParaRPr lang="en-US" dirty="0"/>
-          </a:p>
-        </p:txBody>
-      </p:sp>
-      <p:pic>
-        <p:nvPicPr>
-          <p:cNvPr id="4098" name="Picture 2"/>
-          <p:cNvPicPr>
-            <a:picLocks noChangeAspect="1" noChangeArrowheads="1"/>
-          </p:cNvPicPr>
-          <p:nvPr/>
-        </p:nvPicPr>
-        <p:blipFill>
-          <a:blip r:embed="rId2" cstate="print"/>
-          <a:srcRect/>
-          <a:stretch>
-            <a:fillRect/>
-          </a:stretch>
-        </p:blipFill>
-        <p:spPr bwMode="auto">
-          <a:xfrm>
-            <a:off x="457200" y="4114800"/>
-            <a:ext cx="5448300" cy="1304925"/>
-          </a:xfrm>
-          <a:prstGeom prst="rect">
-            <a:avLst/>
-          </a:prstGeom>
-          <a:noFill/>
-          <a:ln w="9525">
-            <a:noFill/>
-            <a:miter lim="800000"/>
-            <a:headEnd/>
-            <a:tailEnd/>
-          </a:ln>
-        </p:spPr>
-      </p:pic>
-      <p:pic>
-        <p:nvPicPr>
-          <p:cNvPr id="4099" name="Picture 3"/>
-          <p:cNvPicPr>
-            <a:picLocks noChangeAspect="1" noChangeArrowheads="1"/>
-          </p:cNvPicPr>
-          <p:nvPr/>
-        </p:nvPicPr>
-        <p:blipFill>
-          <a:blip r:embed="rId3" cstate="print"/>
-          <a:srcRect/>
-          <a:stretch>
-            <a:fillRect/>
-          </a:stretch>
-        </p:blipFill>
-        <p:spPr bwMode="auto">
-          <a:xfrm>
-            <a:off x="6172200" y="3352800"/>
-            <a:ext cx="2189468" cy="3276600"/>
-          </a:xfrm>
-          <a:prstGeom prst="rect">
-            <a:avLst/>
-          </a:prstGeom>
-          <a:noFill/>
-          <a:ln w="9525">
-            <a:noFill/>
-            <a:miter lim="800000"/>
-            <a:headEnd/>
-            <a:tailEnd/>
-          </a:ln>
-        </p:spPr>
-      </p:pic>
-      <p:sp>
-        <p:nvSpPr>
-          <p:cNvPr id="8" name="TextBox 7"/>
-          <p:cNvSpPr txBox="1"/>
-          <p:nvPr/>
-        </p:nvSpPr>
-        <p:spPr>
-          <a:xfrm>
-            <a:off x="304800" y="5562600"/>
-            <a:ext cx="5236113" cy="646331"/>
-          </a:xfrm>
-          <a:prstGeom prst="rect">
-            <a:avLst/>
-          </a:prstGeom>
-          <a:noFill/>
-        </p:spPr>
-        <p:txBody>
-          <a:bodyPr wrap="none" rtlCol="0">
-            <a:spAutoFit/>
-          </a:bodyPr>
-          <a:lstStyle/>
-          <a:p>
-            <a:r>
-              <a:rPr lang="en-US" dirty="0" smtClean="0"/>
-              <a:t>N * p = # of expected false positives at a given p-value</a:t>
-            </a:r>
-          </a:p>
-          <a:p>
-            <a:r>
-              <a:rPr lang="en-US" dirty="0" smtClean="0"/>
-              <a:t> k = # of genes actually observed at that p-value</a:t>
+              <a:t>This is less conservative than </a:t>
+            </a:r>
+            <a:r>
+              <a:rPr lang="en-US" dirty="0" err="1" smtClean="0"/>
+              <a:t>Bonferroni</a:t>
+            </a:r>
+            <a:r>
+              <a:rPr lang="en-US" dirty="0" smtClean="0"/>
+              <a:t> correction, where there is a 5% chance</a:t>
+            </a:r>
+          </a:p>
+          <a:p>
+            <a:r>
+              <a:rPr lang="en-US" dirty="0" smtClean="0"/>
+              <a:t>that </a:t>
+            </a:r>
+            <a:r>
+              <a:rPr lang="en-US" dirty="0" smtClean="0">
+                <a:solidFill>
+                  <a:srgbClr val="FF0000"/>
+                </a:solidFill>
+              </a:rPr>
+              <a:t>any</a:t>
+            </a:r>
+            <a:r>
+              <a:rPr lang="en-US" dirty="0" smtClean="0"/>
+              <a:t> of our hits are false positives.</a:t>
             </a:r>
             <a:endParaRPr lang="en-US" dirty="0"/>
           </a:p>
@@ -12278,9 +12279,161 @@
           <p:nvPr/>
         </p:nvSpPr>
         <p:spPr>
-          <a:xfrm>
-            <a:off x="838200" y="533400"/>
-            <a:ext cx="7449603" cy="2585323"/>
+          <a:xfrm flipH="1">
+            <a:off x="380998" y="228600"/>
+            <a:ext cx="7696201" cy="3416320"/>
+          </a:xfrm>
+          <a:prstGeom prst="rect">
+            <a:avLst/>
+          </a:prstGeom>
+          <a:noFill/>
+        </p:spPr>
+        <p:txBody>
+          <a:bodyPr wrap="square" rtlCol="0">
+            <a:spAutoFit/>
+          </a:bodyPr>
+          <a:lstStyle/>
+          <a:p>
+            <a:r>
+              <a:rPr lang="en-US" dirty="0" smtClean="0"/>
+              <a:t>One straight-forward approach to finding genes at a given false-discovery rate</a:t>
+            </a:r>
+          </a:p>
+          <a:p>
+            <a:endParaRPr lang="en-US" dirty="0" smtClean="0"/>
+          </a:p>
+          <a:p>
+            <a:r>
+              <a:rPr lang="en-US" dirty="0" err="1" smtClean="0"/>
+              <a:t>Benjamini</a:t>
+            </a:r>
+            <a:r>
+              <a:rPr lang="en-US" dirty="0" smtClean="0"/>
+              <a:t> and Hochberg FDR</a:t>
+            </a:r>
+          </a:p>
+          <a:p>
+            <a:endParaRPr lang="en-US" dirty="0" smtClean="0"/>
+          </a:p>
+          <a:p>
+            <a:r>
+              <a:rPr lang="en-US" dirty="0" smtClean="0"/>
+              <a:t>	1.  Rank all the p-values (smallest first).  The rank of each value = K</a:t>
+            </a:r>
+          </a:p>
+          <a:p>
+            <a:endParaRPr lang="en-US" dirty="0" smtClean="0"/>
+          </a:p>
+          <a:p>
+            <a:r>
+              <a:rPr lang="en-US" dirty="0" smtClean="0"/>
+              <a:t>	2.  Calculate N * p / k </a:t>
+            </a:r>
+          </a:p>
+          <a:p>
+            <a:r>
+              <a:rPr lang="en-US" dirty="0" smtClean="0"/>
+              <a:t>		where N = the # of hypotheses that you are testing</a:t>
+            </a:r>
+          </a:p>
+          <a:p>
+            <a:r>
+              <a:rPr lang="en-US" dirty="0" smtClean="0"/>
+              <a:t>		             p = the “raw” (uncorrected) p-value.</a:t>
+            </a:r>
+          </a:p>
+          <a:p>
+            <a:endParaRPr lang="en-US" dirty="0" smtClean="0"/>
+          </a:p>
+          <a:p>
+            <a:r>
+              <a:rPr lang="en-US" dirty="0" smtClean="0"/>
+              <a:t>	3.  Start at the top of the list.  Go down to N * p / k &gt; threshold </a:t>
+            </a:r>
+          </a:p>
+          <a:p>
+            <a:r>
+              <a:rPr lang="en-US" dirty="0" smtClean="0"/>
+              <a:t>		(e.g. 0.10 for 10% FDR). </a:t>
+            </a:r>
+            <a:endParaRPr lang="en-US" dirty="0"/>
+          </a:p>
+        </p:txBody>
+      </p:sp>
+      <p:pic>
+        <p:nvPicPr>
+          <p:cNvPr id="4098" name="Picture 2"/>
+          <p:cNvPicPr>
+            <a:picLocks noChangeAspect="1" noChangeArrowheads="1"/>
+          </p:cNvPicPr>
+          <p:nvPr/>
+        </p:nvPicPr>
+        <p:blipFill>
+          <a:blip r:embed="rId2" cstate="print"/>
+          <a:srcRect/>
+          <a:stretch>
+            <a:fillRect/>
+          </a:stretch>
+        </p:blipFill>
+        <p:spPr bwMode="auto">
+          <a:xfrm>
+            <a:off x="457200" y="4114800"/>
+            <a:ext cx="5448300" cy="1304925"/>
+          </a:xfrm>
+          <a:prstGeom prst="rect">
+            <a:avLst/>
+          </a:prstGeom>
+          <a:noFill/>
+          <a:ln w="9525">
+            <a:noFill/>
+            <a:miter lim="800000"/>
+            <a:headEnd/>
+            <a:tailEnd/>
+          </a:ln>
+        </p:spPr>
+      </p:pic>
+      <p:pic>
+        <p:nvPicPr>
+          <p:cNvPr id="4099" name="Picture 3"/>
+          <p:cNvPicPr>
+            <a:picLocks noChangeAspect="1" noChangeArrowheads="1"/>
+          </p:cNvPicPr>
+          <p:nvPr/>
+        </p:nvPicPr>
+        <p:blipFill>
+          <a:blip r:embed="rId3" cstate="print"/>
+          <a:srcRect/>
+          <a:stretch>
+            <a:fillRect/>
+          </a:stretch>
+        </p:blipFill>
+        <p:spPr bwMode="auto">
+          <a:xfrm>
+            <a:off x="6172200" y="3352800"/>
+            <a:ext cx="2189468" cy="3276600"/>
+          </a:xfrm>
+          <a:prstGeom prst="rect">
+            <a:avLst/>
+          </a:prstGeom>
+          <a:noFill/>
+          <a:ln w="9525">
+            <a:noFill/>
+            <a:miter lim="800000"/>
+            <a:headEnd/>
+            <a:tailEnd/>
+          </a:ln>
+        </p:spPr>
+      </p:pic>
+      <p:sp>
+        <p:nvSpPr>
+          <p:cNvPr id="8" name="TextBox 7"/>
+          <p:cNvSpPr txBox="1"/>
+          <p:nvPr/>
+        </p:nvSpPr>
+        <p:spPr>
+          <a:xfrm>
+            <a:off x="304800" y="5562600"/>
+            <a:ext cx="5236113" cy="646331"/>
           </a:xfrm>
           <a:prstGeom prst="rect">
             <a:avLst/>
@@ -12295,50 +12448,13 @@
           <a:p>
             <a:r>
               <a:rPr lang="en-US" dirty="0" smtClean="0"/>
-              <a:t>Note that for the first hit (smallest p-value), </a:t>
-            </a:r>
-          </a:p>
-          <a:p>
-            <a:r>
-              <a:rPr lang="en-US" dirty="0" err="1" smtClean="0"/>
-              <a:t>Bonferroni</a:t>
-            </a:r>
-            <a:r>
-              <a:rPr lang="en-US" dirty="0" smtClean="0"/>
-              <a:t> correction is the same as BH FDR.</a:t>
-            </a:r>
-          </a:p>
-          <a:p>
-            <a:endParaRPr lang="en-US" dirty="0" smtClean="0"/>
-          </a:p>
-          <a:p>
-            <a:r>
-              <a:rPr lang="en-US" dirty="0" smtClean="0"/>
-              <a:t>(Since if k=1,</a:t>
-            </a:r>
-          </a:p>
-          <a:p>
-            <a:endParaRPr lang="en-US" dirty="0" smtClean="0"/>
-          </a:p>
-          <a:p>
-            <a:r>
-              <a:rPr lang="en-US" dirty="0" smtClean="0"/>
-              <a:t>	N * p / K = N * p</a:t>
-            </a:r>
-          </a:p>
-          <a:p>
-            <a:endParaRPr lang="en-US" dirty="0" smtClean="0"/>
-          </a:p>
-          <a:p>
-            <a:r>
-              <a:rPr lang="en-US" dirty="0" smtClean="0"/>
-              <a:t>which is the same as multiplying the p-value by the number of hypotheses to </a:t>
-            </a:r>
-          </a:p>
-          <a:p>
-            <a:r>
-              <a:rPr lang="en-US" dirty="0" smtClean="0"/>
-              <a:t>do the correction)</a:t>
+              <a:t>N * p = # of expected false positives at a given p-value</a:t>
+            </a:r>
+          </a:p>
+          <a:p>
+            <a:r>
+              <a:rPr lang="en-US" dirty="0" smtClean="0"/>
+              <a:t> k = # of genes actually observed at that p-value</a:t>
             </a:r>
             <a:endParaRPr lang="en-US" dirty="0"/>
           </a:p>
@@ -12476,6 +12592,104 @@
           <a:chExt cx="0" cy="0"/>
         </a:xfrm>
       </p:grpSpPr>
+      <p:sp>
+        <p:nvSpPr>
+          <p:cNvPr id="4" name="TextBox 3"/>
+          <p:cNvSpPr txBox="1"/>
+          <p:nvPr/>
+        </p:nvSpPr>
+        <p:spPr>
+          <a:xfrm>
+            <a:off x="838200" y="533400"/>
+            <a:ext cx="7449603" cy="2585323"/>
+          </a:xfrm>
+          <a:prstGeom prst="rect">
+            <a:avLst/>
+          </a:prstGeom>
+          <a:noFill/>
+        </p:spPr>
+        <p:txBody>
+          <a:bodyPr wrap="none" rtlCol="0">
+            <a:spAutoFit/>
+          </a:bodyPr>
+          <a:lstStyle/>
+          <a:p>
+            <a:r>
+              <a:rPr lang="en-US" dirty="0" smtClean="0"/>
+              <a:t>Note that for the first hit (smallest p-value), </a:t>
+            </a:r>
+          </a:p>
+          <a:p>
+            <a:r>
+              <a:rPr lang="en-US" dirty="0" err="1" smtClean="0"/>
+              <a:t>Bonferroni</a:t>
+            </a:r>
+            <a:r>
+              <a:rPr lang="en-US" dirty="0" smtClean="0"/>
+              <a:t> correction is the same as BH FDR.</a:t>
+            </a:r>
+          </a:p>
+          <a:p>
+            <a:endParaRPr lang="en-US" dirty="0" smtClean="0"/>
+          </a:p>
+          <a:p>
+            <a:r>
+              <a:rPr lang="en-US" dirty="0" smtClean="0"/>
+              <a:t>(Since if k=1,</a:t>
+            </a:r>
+          </a:p>
+          <a:p>
+            <a:endParaRPr lang="en-US" dirty="0" smtClean="0"/>
+          </a:p>
+          <a:p>
+            <a:r>
+              <a:rPr lang="en-US" dirty="0" smtClean="0"/>
+              <a:t>	N * p / K = N * p</a:t>
+            </a:r>
+          </a:p>
+          <a:p>
+            <a:endParaRPr lang="en-US" dirty="0" smtClean="0"/>
+          </a:p>
+          <a:p>
+            <a:r>
+              <a:rPr lang="en-US" dirty="0" smtClean="0"/>
+              <a:t>which is the same as multiplying the p-value by the number of hypotheses to </a:t>
+            </a:r>
+          </a:p>
+          <a:p>
+            <a:r>
+              <a:rPr lang="en-US" dirty="0" smtClean="0"/>
+              <a:t>do the correction)</a:t>
+            </a:r>
+            <a:endParaRPr lang="en-US" dirty="0"/>
+          </a:p>
+        </p:txBody>
+      </p:sp>
+    </p:spTree>
+  </p:cSld>
+  <p:clrMapOvr>
+    <a:masterClrMapping/>
+  </p:clrMapOvr>
+</p:sld>
+</file>
+
+<file path=ppt/slides/slide51.xml><?xml version="1.0" encoding="utf-8"?>
+<p:sld xmlns:a="http://schemas.openxmlformats.org/drawingml/2006/main" xmlns:r="http://schemas.openxmlformats.org/officeDocument/2006/relationships" xmlns:p="http://schemas.openxmlformats.org/presentationml/2006/main">
+  <p:cSld>
+    <p:spTree>
+      <p:nvGrpSpPr>
+        <p:cNvPr id="1" name=""/>
+        <p:cNvGrpSpPr/>
+        <p:nvPr/>
+      </p:nvGrpSpPr>
+      <p:grpSpPr>
+        <a:xfrm>
+          <a:off x="0" y="0"/>
+          <a:ext cx="0" cy="0"/>
+          <a:chOff x="0" y="0"/>
+          <a:chExt cx="0" cy="0"/>
+        </a:xfrm>
+      </p:grpSpPr>
       <p:pic>
         <p:nvPicPr>
           <p:cNvPr id="4" name="Picture 3"/>
@@ -12690,7 +12904,7 @@
 </p:sld>
 </file>
 
-<file path=ppt/slides/slide51.xml><?xml version="1.0" encoding="utf-8"?>
+<file path=ppt/slides/slide52.xml><?xml version="1.0" encoding="utf-8"?>
 <p:sld xmlns:a="http://schemas.openxmlformats.org/drawingml/2006/main" xmlns:r="http://schemas.openxmlformats.org/officeDocument/2006/relationships" xmlns:p="http://schemas.openxmlformats.org/presentationml/2006/main">
   <p:cSld>
     <p:spTree>

</xml_diff>

<commit_message>
Fix small bugs in lecture...
</commit_message>
<xml_diff>
--- a/classes/stats2015/Lecture11.pptx
+++ b/classes/stats2015/Lecture11.pptx
@@ -244,7 +244,7 @@
             <a:fld id="{5C0EE926-3778-4231-96B9-8CC56DC35E95}" type="datetimeFigureOut">
               <a:rPr lang="en-US" smtClean="0"/>
               <a:pPr/>
-              <a:t>2/21/2015</a:t>
+              <a:t>3/9/2015</a:t>
             </a:fld>
             <a:endParaRPr lang="en-US"/>
           </a:p>
@@ -1430,7 +1430,7 @@
             <a:fld id="{1D8BD707-D9CF-40AE-B4C6-C98DA3205C09}" type="datetimeFigureOut">
               <a:rPr lang="en-US" smtClean="0"/>
               <a:pPr/>
-              <a:t>2/21/2015</a:t>
+              <a:t>3/9/2015</a:t>
             </a:fld>
             <a:endParaRPr lang="en-US"/>
           </a:p>
@@ -1597,7 +1597,7 @@
             <a:fld id="{1D8BD707-D9CF-40AE-B4C6-C98DA3205C09}" type="datetimeFigureOut">
               <a:rPr lang="en-US" smtClean="0"/>
               <a:pPr/>
-              <a:t>2/21/2015</a:t>
+              <a:t>3/9/2015</a:t>
             </a:fld>
             <a:endParaRPr lang="en-US"/>
           </a:p>
@@ -1774,7 +1774,7 @@
             <a:fld id="{1D8BD707-D9CF-40AE-B4C6-C98DA3205C09}" type="datetimeFigureOut">
               <a:rPr lang="en-US" smtClean="0"/>
               <a:pPr/>
-              <a:t>2/21/2015</a:t>
+              <a:t>3/9/2015</a:t>
             </a:fld>
             <a:endParaRPr lang="en-US"/>
           </a:p>
@@ -1941,7 +1941,7 @@
             <a:fld id="{1D8BD707-D9CF-40AE-B4C6-C98DA3205C09}" type="datetimeFigureOut">
               <a:rPr lang="en-US" smtClean="0"/>
               <a:pPr/>
-              <a:t>2/21/2015</a:t>
+              <a:t>3/9/2015</a:t>
             </a:fld>
             <a:endParaRPr lang="en-US"/>
           </a:p>
@@ -2184,7 +2184,7 @@
             <a:fld id="{1D8BD707-D9CF-40AE-B4C6-C98DA3205C09}" type="datetimeFigureOut">
               <a:rPr lang="en-US" smtClean="0"/>
               <a:pPr/>
-              <a:t>2/21/2015</a:t>
+              <a:t>3/9/2015</a:t>
             </a:fld>
             <a:endParaRPr lang="en-US"/>
           </a:p>
@@ -2469,7 +2469,7 @@
             <a:fld id="{1D8BD707-D9CF-40AE-B4C6-C98DA3205C09}" type="datetimeFigureOut">
               <a:rPr lang="en-US" smtClean="0"/>
               <a:pPr/>
-              <a:t>2/21/2015</a:t>
+              <a:t>3/9/2015</a:t>
             </a:fld>
             <a:endParaRPr lang="en-US"/>
           </a:p>
@@ -2888,7 +2888,7 @@
             <a:fld id="{1D8BD707-D9CF-40AE-B4C6-C98DA3205C09}" type="datetimeFigureOut">
               <a:rPr lang="en-US" smtClean="0"/>
               <a:pPr/>
-              <a:t>2/21/2015</a:t>
+              <a:t>3/9/2015</a:t>
             </a:fld>
             <a:endParaRPr lang="en-US"/>
           </a:p>
@@ -3003,7 +3003,7 @@
             <a:fld id="{1D8BD707-D9CF-40AE-B4C6-C98DA3205C09}" type="datetimeFigureOut">
               <a:rPr lang="en-US" smtClean="0"/>
               <a:pPr/>
-              <a:t>2/21/2015</a:t>
+              <a:t>3/9/2015</a:t>
             </a:fld>
             <a:endParaRPr lang="en-US"/>
           </a:p>
@@ -3095,7 +3095,7 @@
             <a:fld id="{1D8BD707-D9CF-40AE-B4C6-C98DA3205C09}" type="datetimeFigureOut">
               <a:rPr lang="en-US" smtClean="0"/>
               <a:pPr/>
-              <a:t>2/21/2015</a:t>
+              <a:t>3/9/2015</a:t>
             </a:fld>
             <a:endParaRPr lang="en-US"/>
           </a:p>
@@ -3369,7 +3369,7 @@
             <a:fld id="{1D8BD707-D9CF-40AE-B4C6-C98DA3205C09}" type="datetimeFigureOut">
               <a:rPr lang="en-US" smtClean="0"/>
               <a:pPr/>
-              <a:t>2/21/2015</a:t>
+              <a:t>3/9/2015</a:t>
             </a:fld>
             <a:endParaRPr lang="en-US"/>
           </a:p>
@@ -3619,7 +3619,7 @@
             <a:fld id="{1D8BD707-D9CF-40AE-B4C6-C98DA3205C09}" type="datetimeFigureOut">
               <a:rPr lang="en-US" smtClean="0"/>
               <a:pPr/>
-              <a:t>2/21/2015</a:t>
+              <a:t>3/9/2015</a:t>
             </a:fld>
             <a:endParaRPr lang="en-US"/>
           </a:p>
@@ -3829,7 +3829,7 @@
             <a:fld id="{1D8BD707-D9CF-40AE-B4C6-C98DA3205C09}" type="datetimeFigureOut">
               <a:rPr lang="en-US" smtClean="0"/>
               <a:pPr/>
-              <a:t>2/21/2015</a:t>
+              <a:t>3/9/2015</a:t>
             </a:fld>
             <a:endParaRPr lang="en-US"/>
           </a:p>
@@ -4291,6 +4291,13 @@
   <p:clrMapOvr>
     <a:masterClrMapping/>
   </p:clrMapOvr>
+  <p:timing>
+    <p:tnLst>
+      <p:par>
+        <p:cTn id="1" dur="indefinite" restart="never" nodeType="tmRoot"/>
+      </p:par>
+    </p:tnLst>
+  </p:timing>
 </p:sld>
 </file>
 
@@ -4567,6 +4574,13 @@
   <p:clrMapOvr>
     <a:masterClrMapping/>
   </p:clrMapOvr>
+  <p:timing>
+    <p:tnLst>
+      <p:par>
+        <p:cTn id="1" dur="indefinite" restart="never" nodeType="tmRoot"/>
+      </p:par>
+    </p:tnLst>
+  </p:timing>
 </p:sld>
 </file>
 
@@ -4660,6 +4674,13 @@
   <p:clrMapOvr>
     <a:masterClrMapping/>
   </p:clrMapOvr>
+  <p:timing>
+    <p:tnLst>
+      <p:par>
+        <p:cTn id="1" dur="indefinite" restart="never" nodeType="tmRoot"/>
+      </p:par>
+    </p:tnLst>
+  </p:timing>
 </p:sld>
 </file>
 
@@ -4771,6 +4792,13 @@
   <p:clrMapOvr>
     <a:masterClrMapping/>
   </p:clrMapOvr>
+  <p:timing>
+    <p:tnLst>
+      <p:par>
+        <p:cTn id="1" dur="indefinite" restart="never" nodeType="tmRoot"/>
+      </p:par>
+    </p:tnLst>
+  </p:timing>
 </p:sld>
 </file>
 
@@ -5032,6 +5060,13 @@
   <p:clrMapOvr>
     <a:masterClrMapping/>
   </p:clrMapOvr>
+  <p:timing>
+    <p:tnLst>
+      <p:par>
+        <p:cTn id="1" dur="indefinite" restart="never" nodeType="tmRoot"/>
+      </p:par>
+    </p:tnLst>
+  </p:timing>
 </p:sld>
 </file>
 
@@ -5143,6 +5178,13 @@
   <p:clrMapOvr>
     <a:masterClrMapping/>
   </p:clrMapOvr>
+  <p:timing>
+    <p:tnLst>
+      <p:par>
+        <p:cTn id="1" dur="indefinite" restart="never" nodeType="tmRoot"/>
+      </p:par>
+    </p:tnLst>
+  </p:timing>
 </p:sld>
 </file>
 
@@ -5237,6 +5279,13 @@
   <p:clrMapOvr>
     <a:masterClrMapping/>
   </p:clrMapOvr>
+  <p:timing>
+    <p:tnLst>
+      <p:par>
+        <p:cTn id="1" dur="indefinite" restart="never" nodeType="tmRoot"/>
+      </p:par>
+    </p:tnLst>
+  </p:timing>
 </p:sld>
 </file>
 
@@ -5425,6 +5474,13 @@
   <p:clrMapOvr>
     <a:masterClrMapping/>
   </p:clrMapOvr>
+  <p:timing>
+    <p:tnLst>
+      <p:par>
+        <p:cTn id="1" dur="indefinite" restart="never" nodeType="tmRoot"/>
+      </p:par>
+    </p:tnLst>
+  </p:timing>
 </p:sld>
 </file>
 
@@ -5582,6 +5638,13 @@
   <p:clrMapOvr>
     <a:masterClrMapping/>
   </p:clrMapOvr>
+  <p:timing>
+    <p:tnLst>
+      <p:par>
+        <p:cTn id="1" dur="indefinite" restart="never" nodeType="tmRoot"/>
+      </p:par>
+    </p:tnLst>
+  </p:timing>
 </p:sld>
 </file>
 
@@ -5871,6 +5934,13 @@
   <p:clrMapOvr>
     <a:masterClrMapping/>
   </p:clrMapOvr>
+  <p:timing>
+    <p:tnLst>
+      <p:par>
+        <p:cTn id="1" dur="indefinite" restart="never" nodeType="tmRoot"/>
+      </p:par>
+    </p:tnLst>
+  </p:timing>
 </p:sld>
 </file>
 
@@ -6100,6 +6170,13 @@
   <p:clrMapOvr>
     <a:masterClrMapping/>
   </p:clrMapOvr>
+  <p:timing>
+    <p:tnLst>
+      <p:par>
+        <p:cTn id="1" dur="indefinite" restart="never" nodeType="tmRoot"/>
+      </p:par>
+    </p:tnLst>
+  </p:timing>
 </p:sld>
 </file>
 
@@ -6217,6 +6294,13 @@
   <p:clrMapOvr>
     <a:masterClrMapping/>
   </p:clrMapOvr>
+  <p:timing>
+    <p:tnLst>
+      <p:par>
+        <p:cTn id="1" dur="indefinite" restart="never" nodeType="tmRoot"/>
+      </p:par>
+    </p:tnLst>
+  </p:timing>
 </p:sld>
 </file>
 
@@ -6390,6 +6474,13 @@
   <p:clrMapOvr>
     <a:masterClrMapping/>
   </p:clrMapOvr>
+  <p:timing>
+    <p:tnLst>
+      <p:par>
+        <p:cTn id="1" dur="indefinite" restart="never" nodeType="tmRoot"/>
+      </p:par>
+    </p:tnLst>
+  </p:timing>
 </p:sld>
 </file>
 
@@ -6586,6 +6677,13 @@
   <p:clrMapOvr>
     <a:masterClrMapping/>
   </p:clrMapOvr>
+  <p:timing>
+    <p:tnLst>
+      <p:par>
+        <p:cTn id="1" dur="indefinite" restart="never" nodeType="tmRoot"/>
+      </p:par>
+    </p:tnLst>
+  </p:timing>
 </p:sld>
 </file>
 
@@ -6636,7 +6734,15 @@
           <a:p>
             <a:r>
               <a:rPr lang="en-US" dirty="0" smtClean="0"/>
-              <a:t>suggests there will be a big shift between 2 days and 18 weeks</a:t>
+              <a:t>suggests there will be a big shift between 2 days and </a:t>
+            </a:r>
+            <a:r>
+              <a:rPr lang="en-US" dirty="0" smtClean="0"/>
+              <a:t>20 </a:t>
+            </a:r>
+            <a:r>
+              <a:rPr lang="en-US" dirty="0" smtClean="0"/>
+              <a:t>weeks</a:t>
             </a:r>
             <a:endParaRPr lang="en-US" dirty="0"/>
           </a:p>
@@ -7002,6 +7108,13 @@
   <p:clrMapOvr>
     <a:masterClrMapping/>
   </p:clrMapOvr>
+  <p:timing>
+    <p:tnLst>
+      <p:par>
+        <p:cTn id="1" dur="indefinite" restart="never" nodeType="tmRoot"/>
+      </p:par>
+    </p:tnLst>
+  </p:timing>
 </p:sld>
 </file>
 
@@ -7435,6 +7548,13 @@
   <p:clrMapOvr>
     <a:masterClrMapping/>
   </p:clrMapOvr>
+  <p:timing>
+    <p:tnLst>
+      <p:par>
+        <p:cTn id="1" dur="indefinite" restart="never" nodeType="tmRoot"/>
+      </p:par>
+    </p:tnLst>
+  </p:timing>
 </p:sld>
 </file>
 
@@ -7651,6 +7771,13 @@
   <p:clrMapOvr>
     <a:masterClrMapping/>
   </p:clrMapOvr>
+  <p:timing>
+    <p:tnLst>
+      <p:par>
+        <p:cTn id="1" dur="indefinite" restart="never" nodeType="tmRoot"/>
+      </p:par>
+    </p:tnLst>
+  </p:timing>
 </p:sld>
 </file>
 
@@ -7787,6 +7914,13 @@
   <p:clrMapOvr>
     <a:masterClrMapping/>
   </p:clrMapOvr>
+  <p:timing>
+    <p:tnLst>
+      <p:par>
+        <p:cTn id="1" dur="indefinite" restart="never" nodeType="tmRoot"/>
+      </p:par>
+    </p:tnLst>
+  </p:timing>
 </p:sld>
 </file>
 
@@ -7880,6 +8014,13 @@
   <p:clrMapOvr>
     <a:masterClrMapping/>
   </p:clrMapOvr>
+  <p:timing>
+    <p:tnLst>
+      <p:par>
+        <p:cTn id="1" dur="indefinite" restart="never" nodeType="tmRoot"/>
+      </p:par>
+    </p:tnLst>
+  </p:timing>
 </p:sld>
 </file>
 
@@ -8093,6 +8234,13 @@
   <p:clrMapOvr>
     <a:masterClrMapping/>
   </p:clrMapOvr>
+  <p:timing>
+    <p:tnLst>
+      <p:par>
+        <p:cTn id="1" dur="indefinite" restart="never" nodeType="tmRoot"/>
+      </p:par>
+    </p:tnLst>
+  </p:timing>
 </p:sld>
 </file>
 
@@ -8212,6 +8360,13 @@
   <p:clrMapOvr>
     <a:masterClrMapping/>
   </p:clrMapOvr>
+  <p:timing>
+    <p:tnLst>
+      <p:par>
+        <p:cTn id="1" dur="indefinite" restart="never" nodeType="tmRoot"/>
+      </p:par>
+    </p:tnLst>
+  </p:timing>
 </p:sld>
 </file>
 
@@ -8299,6 +8454,13 @@
   <p:clrMapOvr>
     <a:masterClrMapping/>
   </p:clrMapOvr>
+  <p:timing>
+    <p:tnLst>
+      <p:par>
+        <p:cTn id="1" dur="indefinite" restart="never" nodeType="tmRoot"/>
+      </p:par>
+    </p:tnLst>
+  </p:timing>
 </p:sld>
 </file>
 
@@ -8585,6 +8747,13 @@
   <p:clrMapOvr>
     <a:masterClrMapping/>
   </p:clrMapOvr>
+  <p:timing>
+    <p:tnLst>
+      <p:par>
+        <p:cTn id="1" dur="indefinite" restart="never" nodeType="tmRoot"/>
+      </p:par>
+    </p:tnLst>
+  </p:timing>
 </p:sld>
 </file>
 
@@ -8900,6 +9069,13 @@
   <p:clrMapOvr>
     <a:masterClrMapping/>
   </p:clrMapOvr>
+  <p:timing>
+    <p:tnLst>
+      <p:par>
+        <p:cTn id="1" dur="indefinite" restart="never" nodeType="tmRoot"/>
+      </p:par>
+    </p:tnLst>
+  </p:timing>
 </p:sld>
 </file>
 
@@ -8993,6 +9169,13 @@
   <p:clrMapOvr>
     <a:masterClrMapping/>
   </p:clrMapOvr>
+  <p:timing>
+    <p:tnLst>
+      <p:par>
+        <p:cTn id="1" dur="indefinite" restart="never" nodeType="tmRoot"/>
+      </p:par>
+    </p:tnLst>
+  </p:timing>
 </p:sld>
 </file>
 
@@ -9118,6 +9301,13 @@
   <p:clrMapOvr>
     <a:masterClrMapping/>
   </p:clrMapOvr>
+  <p:timing>
+    <p:tnLst>
+      <p:par>
+        <p:cTn id="1" dur="indefinite" restart="never" nodeType="tmRoot"/>
+      </p:par>
+    </p:tnLst>
+  </p:timing>
 </p:sld>
 </file>
 
@@ -9297,6 +9487,13 @@
   <p:clrMapOvr>
     <a:masterClrMapping/>
   </p:clrMapOvr>
+  <p:timing>
+    <p:tnLst>
+      <p:par>
+        <p:cTn id="1" dur="indefinite" restart="never" nodeType="tmRoot"/>
+      </p:par>
+    </p:tnLst>
+  </p:timing>
 </p:sld>
 </file>
 
@@ -9516,7 +9713,7 @@
         </p:blipFill>
         <p:spPr bwMode="auto">
           <a:xfrm>
-            <a:off x="381000" y="2209800"/>
+            <a:off x="381000" y="2057400"/>
             <a:ext cx="3429000" cy="3331400"/>
           </a:xfrm>
           <a:prstGeom prst="rect">
@@ -9568,6 +9765,13 @@
   <p:clrMapOvr>
     <a:masterClrMapping/>
   </p:clrMapOvr>
+  <p:timing>
+    <p:tnLst>
+      <p:par>
+        <p:cTn id="1" dur="indefinite" restart="never" nodeType="tmRoot"/>
+      </p:par>
+    </p:tnLst>
+  </p:timing>
 </p:sld>
 </file>
 
@@ -9685,6 +9889,13 @@
   <p:clrMapOvr>
     <a:masterClrMapping/>
   </p:clrMapOvr>
+  <p:timing>
+    <p:tnLst>
+      <p:par>
+        <p:cTn id="1" dur="indefinite" restart="never" nodeType="tmRoot"/>
+      </p:par>
+    </p:tnLst>
+  </p:timing>
 </p:sld>
 </file>
 
@@ -9919,6 +10130,13 @@
   <p:clrMapOvr>
     <a:masterClrMapping/>
   </p:clrMapOvr>
+  <p:timing>
+    <p:tnLst>
+      <p:par>
+        <p:cTn id="1" dur="indefinite" restart="never" nodeType="tmRoot"/>
+      </p:par>
+    </p:tnLst>
+  </p:timing>
 </p:sld>
 </file>
 
@@ -10108,6 +10326,13 @@
   <p:clrMapOvr>
     <a:masterClrMapping/>
   </p:clrMapOvr>
+  <p:timing>
+    <p:tnLst>
+      <p:par>
+        <p:cTn id="1" dur="indefinite" restart="never" nodeType="tmRoot"/>
+      </p:par>
+    </p:tnLst>
+  </p:timing>
 </p:sld>
 </file>
 
@@ -10201,7 +10426,7 @@
         <p:spPr>
           <a:xfrm>
             <a:off x="228600" y="1447800"/>
-            <a:ext cx="8311186" cy="646331"/>
+            <a:ext cx="5847626" cy="369332"/>
           </a:xfrm>
           <a:prstGeom prst="rect">
             <a:avLst/>
@@ -10216,15 +10441,13 @@
           <a:p>
             <a:r>
               <a:rPr lang="en-US" dirty="0" smtClean="0"/>
-              <a:t>We can, if we want, switch to the “local regression” method.</a:t>
-            </a:r>
-          </a:p>
-          <a:p>
-            <a:r>
-              <a:rPr lang="en-US" dirty="0" smtClean="0"/>
-              <a:t>Part of your homework will be to investigate the consequences of these two methods..</a:t>
-            </a:r>
-            <a:endParaRPr lang="en-US" dirty="0"/>
+              <a:t>We can, if we want, switch to the “local regression” method</a:t>
+            </a:r>
+            <a:r>
+              <a:rPr lang="en-US" dirty="0" smtClean="0"/>
+              <a:t>.</a:t>
+            </a:r>
+            <a:endParaRPr lang="en-US" dirty="0" smtClean="0"/>
           </a:p>
         </p:txBody>
       </p:sp>
@@ -10393,6 +10616,13 @@
   <p:clrMapOvr>
     <a:masterClrMapping/>
   </p:clrMapOvr>
+  <p:timing>
+    <p:tnLst>
+      <p:par>
+        <p:cTn id="1" dur="indefinite" restart="never" nodeType="tmRoot"/>
+      </p:par>
+    </p:tnLst>
+  </p:timing>
 </p:sld>
 </file>
 
@@ -10545,6 +10775,13 @@
   <p:clrMapOvr>
     <a:masterClrMapping/>
   </p:clrMapOvr>
+  <p:timing>
+    <p:tnLst>
+      <p:par>
+        <p:cTn id="1" dur="indefinite" restart="never" nodeType="tmRoot"/>
+      </p:par>
+    </p:tnLst>
+  </p:timing>
 </p:sld>
 </file>
 
@@ -10632,6 +10869,13 @@
   <p:clrMapOvr>
     <a:masterClrMapping/>
   </p:clrMapOvr>
+  <p:timing>
+    <p:tnLst>
+      <p:par>
+        <p:cTn id="1" dur="indefinite" restart="never" nodeType="tmRoot"/>
+      </p:par>
+    </p:tnLst>
+  </p:timing>
 </p:sld>
 </file>
 
@@ -10864,6 +11108,13 @@
   <p:clrMapOvr>
     <a:masterClrMapping/>
   </p:clrMapOvr>
+  <p:timing>
+    <p:tnLst>
+      <p:par>
+        <p:cTn id="1" dur="indefinite" restart="never" nodeType="tmRoot"/>
+      </p:par>
+    </p:tnLst>
+  </p:timing>
 </p:sld>
 </file>
 
@@ -12572,6 +12823,13 @@
   <p:clrMapOvr>
     <a:masterClrMapping/>
   </p:clrMapOvr>
+  <p:timing>
+    <p:tnLst>
+      <p:par>
+        <p:cTn id="1" dur="indefinite" restart="never" nodeType="tmRoot"/>
+      </p:par>
+    </p:tnLst>
+  </p:timing>
 </p:sld>
 </file>
 
@@ -13248,6 +13506,13 @@
   <p:clrMapOvr>
     <a:masterClrMapping/>
   </p:clrMapOvr>
+  <p:timing>
+    <p:tnLst>
+      <p:par>
+        <p:cTn id="1" dur="indefinite" restart="never" nodeType="tmRoot"/>
+      </p:par>
+    </p:tnLst>
+  </p:timing>
 </p:sld>
 </file>
 
@@ -13773,6 +14038,13 @@
   <p:clrMapOvr>
     <a:masterClrMapping/>
   </p:clrMapOvr>
+  <p:timing>
+    <p:tnLst>
+      <p:par>
+        <p:cTn id="1" dur="indefinite" restart="never" nodeType="tmRoot"/>
+      </p:par>
+    </p:tnLst>
+  </p:timing>
 </p:sld>
 </file>
 
@@ -14346,6 +14618,13 @@
   <p:clrMapOvr>
     <a:masterClrMapping/>
   </p:clrMapOvr>
+  <p:timing>
+    <p:tnLst>
+      <p:par>
+        <p:cTn id="1" dur="indefinite" restart="never" nodeType="tmRoot"/>
+      </p:par>
+    </p:tnLst>
+  </p:timing>
 </p:sld>
 </file>
 
@@ -14669,6 +14948,13 @@
   <p:clrMapOvr>
     <a:masterClrMapping/>
   </p:clrMapOvr>
+  <p:timing>
+    <p:tnLst>
+      <p:par>
+        <p:cTn id="1" dur="indefinite" restart="never" nodeType="tmRoot"/>
+      </p:par>
+    </p:tnLst>
+  </p:timing>
 </p:sld>
 </file>
 

</xml_diff>

<commit_message>
small change to lecture #11
</commit_message>
<xml_diff>
--- a/classes/stats2015/Lecture11.pptx
+++ b/classes/stats2015/Lecture11.pptx
@@ -244,7 +244,7 @@
             <a:fld id="{5C0EE926-3778-4231-96B9-8CC56DC35E95}" type="datetimeFigureOut">
               <a:rPr lang="en-US" smtClean="0"/>
               <a:pPr/>
-              <a:t>3/9/2015</a:t>
+              <a:t>3/11/2015</a:t>
             </a:fld>
             <a:endParaRPr lang="en-US"/>
           </a:p>
@@ -1430,7 +1430,7 @@
             <a:fld id="{1D8BD707-D9CF-40AE-B4C6-C98DA3205C09}" type="datetimeFigureOut">
               <a:rPr lang="en-US" smtClean="0"/>
               <a:pPr/>
-              <a:t>3/9/2015</a:t>
+              <a:t>3/11/2015</a:t>
             </a:fld>
             <a:endParaRPr lang="en-US"/>
           </a:p>
@@ -1597,7 +1597,7 @@
             <a:fld id="{1D8BD707-D9CF-40AE-B4C6-C98DA3205C09}" type="datetimeFigureOut">
               <a:rPr lang="en-US" smtClean="0"/>
               <a:pPr/>
-              <a:t>3/9/2015</a:t>
+              <a:t>3/11/2015</a:t>
             </a:fld>
             <a:endParaRPr lang="en-US"/>
           </a:p>
@@ -1774,7 +1774,7 @@
             <a:fld id="{1D8BD707-D9CF-40AE-B4C6-C98DA3205C09}" type="datetimeFigureOut">
               <a:rPr lang="en-US" smtClean="0"/>
               <a:pPr/>
-              <a:t>3/9/2015</a:t>
+              <a:t>3/11/2015</a:t>
             </a:fld>
             <a:endParaRPr lang="en-US"/>
           </a:p>
@@ -1941,7 +1941,7 @@
             <a:fld id="{1D8BD707-D9CF-40AE-B4C6-C98DA3205C09}" type="datetimeFigureOut">
               <a:rPr lang="en-US" smtClean="0"/>
               <a:pPr/>
-              <a:t>3/9/2015</a:t>
+              <a:t>3/11/2015</a:t>
             </a:fld>
             <a:endParaRPr lang="en-US"/>
           </a:p>
@@ -2184,7 +2184,7 @@
             <a:fld id="{1D8BD707-D9CF-40AE-B4C6-C98DA3205C09}" type="datetimeFigureOut">
               <a:rPr lang="en-US" smtClean="0"/>
               <a:pPr/>
-              <a:t>3/9/2015</a:t>
+              <a:t>3/11/2015</a:t>
             </a:fld>
             <a:endParaRPr lang="en-US"/>
           </a:p>
@@ -2469,7 +2469,7 @@
             <a:fld id="{1D8BD707-D9CF-40AE-B4C6-C98DA3205C09}" type="datetimeFigureOut">
               <a:rPr lang="en-US" smtClean="0"/>
               <a:pPr/>
-              <a:t>3/9/2015</a:t>
+              <a:t>3/11/2015</a:t>
             </a:fld>
             <a:endParaRPr lang="en-US"/>
           </a:p>
@@ -2888,7 +2888,7 @@
             <a:fld id="{1D8BD707-D9CF-40AE-B4C6-C98DA3205C09}" type="datetimeFigureOut">
               <a:rPr lang="en-US" smtClean="0"/>
               <a:pPr/>
-              <a:t>3/9/2015</a:t>
+              <a:t>3/11/2015</a:t>
             </a:fld>
             <a:endParaRPr lang="en-US"/>
           </a:p>
@@ -3003,7 +3003,7 @@
             <a:fld id="{1D8BD707-D9CF-40AE-B4C6-C98DA3205C09}" type="datetimeFigureOut">
               <a:rPr lang="en-US" smtClean="0"/>
               <a:pPr/>
-              <a:t>3/9/2015</a:t>
+              <a:t>3/11/2015</a:t>
             </a:fld>
             <a:endParaRPr lang="en-US"/>
           </a:p>
@@ -3095,7 +3095,7 @@
             <a:fld id="{1D8BD707-D9CF-40AE-B4C6-C98DA3205C09}" type="datetimeFigureOut">
               <a:rPr lang="en-US" smtClean="0"/>
               <a:pPr/>
-              <a:t>3/9/2015</a:t>
+              <a:t>3/11/2015</a:t>
             </a:fld>
             <a:endParaRPr lang="en-US"/>
           </a:p>
@@ -3369,7 +3369,7 @@
             <a:fld id="{1D8BD707-D9CF-40AE-B4C6-C98DA3205C09}" type="datetimeFigureOut">
               <a:rPr lang="en-US" smtClean="0"/>
               <a:pPr/>
-              <a:t>3/9/2015</a:t>
+              <a:t>3/11/2015</a:t>
             </a:fld>
             <a:endParaRPr lang="en-US"/>
           </a:p>
@@ -3619,7 +3619,7 @@
             <a:fld id="{1D8BD707-D9CF-40AE-B4C6-C98DA3205C09}" type="datetimeFigureOut">
               <a:rPr lang="en-US" smtClean="0"/>
               <a:pPr/>
-              <a:t>3/9/2015</a:t>
+              <a:t>3/11/2015</a:t>
             </a:fld>
             <a:endParaRPr lang="en-US"/>
           </a:p>
@@ -3829,7 +3829,7 @@
             <a:fld id="{1D8BD707-D9CF-40AE-B4C6-C98DA3205C09}" type="datetimeFigureOut">
               <a:rPr lang="en-US" smtClean="0"/>
               <a:pPr/>
-              <a:t>3/9/2015</a:t>
+              <a:t>3/11/2015</a:t>
             </a:fld>
             <a:endParaRPr lang="en-US"/>
           </a:p>
@@ -6734,15 +6734,7 @@
           <a:p>
             <a:r>
               <a:rPr lang="en-US" dirty="0" smtClean="0"/>
-              <a:t>suggests there will be a big shift between 2 days and </a:t>
-            </a:r>
-            <a:r>
-              <a:rPr lang="en-US" dirty="0" smtClean="0"/>
-              <a:t>20 </a:t>
-            </a:r>
-            <a:r>
-              <a:rPr lang="en-US" dirty="0" smtClean="0"/>
-              <a:t>weeks</a:t>
+              <a:t>suggests there will be a big shift between 2 days and 20 weeks</a:t>
             </a:r>
             <a:endParaRPr lang="en-US" dirty="0"/>
           </a:p>
@@ -9854,36 +9846,6 @@
           </a:p>
         </p:txBody>
       </p:sp>
-      <p:sp>
-        <p:nvSpPr>
-          <p:cNvPr id="4" name="TextBox 3"/>
-          <p:cNvSpPr txBox="1"/>
-          <p:nvPr/>
-        </p:nvSpPr>
-        <p:spPr>
-          <a:xfrm>
-            <a:off x="609600" y="6248400"/>
-            <a:ext cx="7467600" cy="646331"/>
-          </a:xfrm>
-          <a:prstGeom prst="rect">
-            <a:avLst/>
-          </a:prstGeom>
-          <a:noFill/>
-        </p:spPr>
-        <p:txBody>
-          <a:bodyPr wrap="square" rtlCol="0">
-            <a:spAutoFit/>
-          </a:bodyPr>
-          <a:lstStyle/>
-          <a:p>
-            <a:r>
-              <a:rPr lang="en-US" dirty="0" smtClean="0"/>
-              <a:t>(I’m a little unclear on why they do this, but as we will see, this adjustment will get removed by their model, so it doesn’t much matter…) </a:t>
-            </a:r>
-            <a:endParaRPr lang="en-US" dirty="0"/>
-          </a:p>
-        </p:txBody>
-      </p:sp>
     </p:spTree>
   </p:cSld>
   <p:clrMapOvr>
@@ -10441,13 +10403,8 @@
           <a:p>
             <a:r>
               <a:rPr lang="en-US" dirty="0" smtClean="0"/>
-              <a:t>We can, if we want, switch to the “local regression” method</a:t>
-            </a:r>
-            <a:r>
-              <a:rPr lang="en-US" dirty="0" smtClean="0"/>
-              <a:t>.</a:t>
-            </a:r>
-            <a:endParaRPr lang="en-US" dirty="0" smtClean="0"/>
+              <a:t>We can, if we want, switch to the “local regression” method.</a:t>
+            </a:r>
           </a:p>
         </p:txBody>
       </p:sp>

</xml_diff>